<commit_message>
Finalização do User stor
</commit_message>
<xml_diff>
--- a/Ppt.pptx
+++ b/Ppt.pptx
@@ -4,6 +4,9 @@
   <p:sldMasterIdLst>
     <p:sldMasterId id="2147483672" r:id="rId1"/>
   </p:sldMasterIdLst>
+  <p:notesMasterIdLst>
+    <p:notesMasterId r:id="rId31"/>
+  </p:notesMasterIdLst>
   <p:sldIdLst>
     <p:sldId id="265" r:id="rId2"/>
     <p:sldId id="278" r:id="rId3"/>
@@ -9816,21 +9819,21 @@
     </dgm:pt>
   </dgm:ptLst>
   <dgm:cxnLst>
+    <dgm:cxn modelId="{2A83E94C-B0A5-43CA-A80E-FDC07FB30C97}" type="presOf" srcId="{4D80D226-ED49-4F74-A9DC-E6739A1E525A}" destId="{72A4396F-6C6D-4572-8D0B-0E5A71BA0032}" srcOrd="0" destOrd="0" presId="urn:microsoft.com/office/officeart/2005/8/layout/hierarchy4"/>
+    <dgm:cxn modelId="{450A96F1-A226-4857-9575-D42BE432BE1B}" type="presOf" srcId="{807B4EC0-DBCD-4A0A-8B06-00253A878830}" destId="{353B51B8-08EC-4BCF-999A-95E8A0758949}" srcOrd="0" destOrd="0" presId="urn:microsoft.com/office/officeart/2005/8/layout/hierarchy4"/>
+    <dgm:cxn modelId="{80C5821F-625F-4F7D-BC8A-B6AE91C3934A}" srcId="{75B7BF33-8AAF-4FD7-9587-CA0D5E8A58EC}" destId="{F7FF83DE-4A98-4D98-88E3-D4B472E51B37}" srcOrd="0" destOrd="0" parTransId="{77F47C2D-8749-48D1-BAA5-FE2905E54005}" sibTransId="{7B7DCFA7-693C-4385-B6BD-78144F3CF178}"/>
+    <dgm:cxn modelId="{7EF210E4-D897-4179-9BC5-389EE7AF9059}" srcId="{DE0B541D-B1EF-49A8-B1B8-4C73363FC6D4}" destId="{66983D87-635D-4AB6-83B7-A56308FCDED8}" srcOrd="0" destOrd="0" parTransId="{9C47322D-F6A7-4719-BB24-C28620ACB50F}" sibTransId="{5CBF6F54-78E8-4641-B73A-672EE79EAF98}"/>
+    <dgm:cxn modelId="{F588288A-658F-4A2E-83A7-74D2DB0AC655}" srcId="{AAE061B8-66B1-4EF6-9A14-8DF9C1B027F9}" destId="{807B4EC0-DBCD-4A0A-8B06-00253A878830}" srcOrd="0" destOrd="0" parTransId="{2C0DBB5A-C660-45FB-A924-7EE7158F60BE}" sibTransId="{E6BD2728-01B4-47C8-BC63-9ABCB0A2F994}"/>
+    <dgm:cxn modelId="{5CA8BEC7-66E9-4325-85EB-7144737DB8DB}" type="presOf" srcId="{DE0B541D-B1EF-49A8-B1B8-4C73363FC6D4}" destId="{BC688DC5-6F0D-4071-810D-259250BFE46E}" srcOrd="0" destOrd="0" presId="urn:microsoft.com/office/officeart/2005/8/layout/hierarchy4"/>
+    <dgm:cxn modelId="{A8BD5C5C-6413-49EA-8C96-E43EEEE39C89}" type="presOf" srcId="{AAE061B8-66B1-4EF6-9A14-8DF9C1B027F9}" destId="{3E066A3C-E4EF-41FF-A4BF-6B6EAB1AAF61}" srcOrd="0" destOrd="0" presId="urn:microsoft.com/office/officeart/2005/8/layout/hierarchy4"/>
     <dgm:cxn modelId="{B5BC5289-EAAE-420F-A0DC-1314614F029B}" type="presOf" srcId="{F7FF83DE-4A98-4D98-88E3-D4B472E51B37}" destId="{76D2BF23-CE72-48BA-B213-54136EFD1F11}" srcOrd="0" destOrd="0" presId="urn:microsoft.com/office/officeart/2005/8/layout/hierarchy4"/>
-    <dgm:cxn modelId="{80C5821F-625F-4F7D-BC8A-B6AE91C3934A}" srcId="{75B7BF33-8AAF-4FD7-9587-CA0D5E8A58EC}" destId="{F7FF83DE-4A98-4D98-88E3-D4B472E51B37}" srcOrd="0" destOrd="0" parTransId="{77F47C2D-8749-48D1-BAA5-FE2905E54005}" sibTransId="{7B7DCFA7-693C-4385-B6BD-78144F3CF178}"/>
-    <dgm:cxn modelId="{F588288A-658F-4A2E-83A7-74D2DB0AC655}" srcId="{AAE061B8-66B1-4EF6-9A14-8DF9C1B027F9}" destId="{807B4EC0-DBCD-4A0A-8B06-00253A878830}" srcOrd="0" destOrd="0" parTransId="{2C0DBB5A-C660-45FB-A924-7EE7158F60BE}" sibTransId="{E6BD2728-01B4-47C8-BC63-9ABCB0A2F994}"/>
-    <dgm:cxn modelId="{2A83E94C-B0A5-43CA-A80E-FDC07FB30C97}" type="presOf" srcId="{4D80D226-ED49-4F74-A9DC-E6739A1E525A}" destId="{72A4396F-6C6D-4572-8D0B-0E5A71BA0032}" srcOrd="0" destOrd="0" presId="urn:microsoft.com/office/officeart/2005/8/layout/hierarchy4"/>
+    <dgm:cxn modelId="{E0207364-9F49-4CCB-9667-C8ACBE412209}" type="presOf" srcId="{75B7BF33-8AAF-4FD7-9587-CA0D5E8A58EC}" destId="{8969E11C-5CBF-4BF1-A6BC-7B90BACD04C4}" srcOrd="0" destOrd="0" presId="urn:microsoft.com/office/officeart/2005/8/layout/hierarchy4"/>
+    <dgm:cxn modelId="{49924C73-89AD-4EE1-B8ED-2B628AE59112}" srcId="{4D80D226-ED49-4F74-A9DC-E6739A1E525A}" destId="{AAE061B8-66B1-4EF6-9A14-8DF9C1B027F9}" srcOrd="0" destOrd="0" parTransId="{86881EF1-C069-47E8-BB28-ACB5208570F6}" sibTransId="{C6852C81-936A-4457-823B-A45AAE0512FE}"/>
+    <dgm:cxn modelId="{7854A23B-DFAF-4932-BC3F-92593C1FF720}" type="presOf" srcId="{40B78537-89BA-4099-9B51-D111571F2F51}" destId="{BF2C47A5-22D6-4556-A6BA-700966C15184}" srcOrd="0" destOrd="0" presId="urn:microsoft.com/office/officeart/2005/8/layout/hierarchy4"/>
+    <dgm:cxn modelId="{3F318998-8C97-494E-A31C-B3B3D41CBC26}" srcId="{4D80D226-ED49-4F74-A9DC-E6739A1E525A}" destId="{75B7BF33-8AAF-4FD7-9587-CA0D5E8A58EC}" srcOrd="1" destOrd="0" parTransId="{5DE4C07D-F0DA-4149-85BF-312A32B65653}" sibTransId="{9CFC7F9F-ACC1-4E61-9FCC-310A7607FB39}"/>
+    <dgm:cxn modelId="{8BFAF09E-8D7B-4CBD-97F1-44E5D272319E}" type="presOf" srcId="{66983D87-635D-4AB6-83B7-A56308FCDED8}" destId="{2D6485A9-B159-4B5F-839A-03A4B14DEE84}" srcOrd="0" destOrd="0" presId="urn:microsoft.com/office/officeart/2005/8/layout/hierarchy4"/>
     <dgm:cxn modelId="{0C743358-E86A-4194-9E97-92B32C117A4C}" srcId="{40B78537-89BA-4099-9B51-D111571F2F51}" destId="{4D80D226-ED49-4F74-A9DC-E6739A1E525A}" srcOrd="0" destOrd="0" parTransId="{3DC520C2-745C-44F2-976A-30A225DB0CA5}" sibTransId="{8F1D3AD4-E37D-44D5-B540-57B561A90D25}"/>
-    <dgm:cxn modelId="{5CA8BEC7-66E9-4325-85EB-7144737DB8DB}" type="presOf" srcId="{DE0B541D-B1EF-49A8-B1B8-4C73363FC6D4}" destId="{BC688DC5-6F0D-4071-810D-259250BFE46E}" srcOrd="0" destOrd="0" presId="urn:microsoft.com/office/officeart/2005/8/layout/hierarchy4"/>
     <dgm:cxn modelId="{50B29E5C-E3E8-4471-BE2C-0DEE63803713}" srcId="{4D80D226-ED49-4F74-A9DC-E6739A1E525A}" destId="{DE0B541D-B1EF-49A8-B1B8-4C73363FC6D4}" srcOrd="2" destOrd="0" parTransId="{014BC2A4-FD1D-4D42-A01D-5289BAB99708}" sibTransId="{A8AC497A-F722-46F2-B50B-41360A498B18}"/>
-    <dgm:cxn modelId="{8BFAF09E-8D7B-4CBD-97F1-44E5D272319E}" type="presOf" srcId="{66983D87-635D-4AB6-83B7-A56308FCDED8}" destId="{2D6485A9-B159-4B5F-839A-03A4B14DEE84}" srcOrd="0" destOrd="0" presId="urn:microsoft.com/office/officeart/2005/8/layout/hierarchy4"/>
-    <dgm:cxn modelId="{E0207364-9F49-4CCB-9667-C8ACBE412209}" type="presOf" srcId="{75B7BF33-8AAF-4FD7-9587-CA0D5E8A58EC}" destId="{8969E11C-5CBF-4BF1-A6BC-7B90BACD04C4}" srcOrd="0" destOrd="0" presId="urn:microsoft.com/office/officeart/2005/8/layout/hierarchy4"/>
-    <dgm:cxn modelId="{3F318998-8C97-494E-A31C-B3B3D41CBC26}" srcId="{4D80D226-ED49-4F74-A9DC-E6739A1E525A}" destId="{75B7BF33-8AAF-4FD7-9587-CA0D5E8A58EC}" srcOrd="1" destOrd="0" parTransId="{5DE4C07D-F0DA-4149-85BF-312A32B65653}" sibTransId="{9CFC7F9F-ACC1-4E61-9FCC-310A7607FB39}"/>
-    <dgm:cxn modelId="{7854A23B-DFAF-4932-BC3F-92593C1FF720}" type="presOf" srcId="{40B78537-89BA-4099-9B51-D111571F2F51}" destId="{BF2C47A5-22D6-4556-A6BA-700966C15184}" srcOrd="0" destOrd="0" presId="urn:microsoft.com/office/officeart/2005/8/layout/hierarchy4"/>
-    <dgm:cxn modelId="{450A96F1-A226-4857-9575-D42BE432BE1B}" type="presOf" srcId="{807B4EC0-DBCD-4A0A-8B06-00253A878830}" destId="{353B51B8-08EC-4BCF-999A-95E8A0758949}" srcOrd="0" destOrd="0" presId="urn:microsoft.com/office/officeart/2005/8/layout/hierarchy4"/>
-    <dgm:cxn modelId="{7EF210E4-D897-4179-9BC5-389EE7AF9059}" srcId="{DE0B541D-B1EF-49A8-B1B8-4C73363FC6D4}" destId="{66983D87-635D-4AB6-83B7-A56308FCDED8}" srcOrd="0" destOrd="0" parTransId="{9C47322D-F6A7-4719-BB24-C28620ACB50F}" sibTransId="{5CBF6F54-78E8-4641-B73A-672EE79EAF98}"/>
-    <dgm:cxn modelId="{A8BD5C5C-6413-49EA-8C96-E43EEEE39C89}" type="presOf" srcId="{AAE061B8-66B1-4EF6-9A14-8DF9C1B027F9}" destId="{3E066A3C-E4EF-41FF-A4BF-6B6EAB1AAF61}" srcOrd="0" destOrd="0" presId="urn:microsoft.com/office/officeart/2005/8/layout/hierarchy4"/>
-    <dgm:cxn modelId="{49924C73-89AD-4EE1-B8ED-2B628AE59112}" srcId="{4D80D226-ED49-4F74-A9DC-E6739A1E525A}" destId="{AAE061B8-66B1-4EF6-9A14-8DF9C1B027F9}" srcOrd="0" destOrd="0" parTransId="{86881EF1-C069-47E8-BB28-ACB5208570F6}" sibTransId="{C6852C81-936A-4457-823B-A45AAE0512FE}"/>
     <dgm:cxn modelId="{F449A1B6-4A4C-43BA-BC3B-9ADCA0B1A5B0}" type="presParOf" srcId="{BF2C47A5-22D6-4556-A6BA-700966C15184}" destId="{5B92B76B-FCAA-4BD9-8CC8-517E08C20AB3}" srcOrd="0" destOrd="0" presId="urn:microsoft.com/office/officeart/2005/8/layout/hierarchy4"/>
     <dgm:cxn modelId="{A73F1CA9-A013-4273-86FB-6DDB22853DE1}" type="presParOf" srcId="{5B92B76B-FCAA-4BD9-8CC8-517E08C20AB3}" destId="{72A4396F-6C6D-4572-8D0B-0E5A71BA0032}" srcOrd="0" destOrd="0" presId="urn:microsoft.com/office/officeart/2005/8/layout/hierarchy4"/>
     <dgm:cxn modelId="{D50D2C29-A996-4DC2-A491-9AFB0402CABC}" type="presParOf" srcId="{5B92B76B-FCAA-4BD9-8CC8-517E08C20AB3}" destId="{343BDA7D-489F-4C5F-974C-44AE7F329B19}" srcOrd="1" destOrd="0" presId="urn:microsoft.com/office/officeart/2005/8/layout/hierarchy4"/>
@@ -40333,6 +40336,440 @@
 </dgm:styleDef>
 </file>
 
+<file path=ppt/notesMasters/notesMaster1.xml><?xml version="1.0" encoding="utf-8"?>
+<p:notesMaster xmlns:a="http://schemas.openxmlformats.org/drawingml/2006/main" xmlns:r="http://schemas.openxmlformats.org/officeDocument/2006/relationships" xmlns:p="http://schemas.openxmlformats.org/presentationml/2006/main">
+  <p:cSld>
+    <p:bg>
+      <p:bgRef idx="1001">
+        <a:schemeClr val="bg1"/>
+      </p:bgRef>
+    </p:bg>
+    <p:spTree>
+      <p:nvGrpSpPr>
+        <p:cNvPr id="1" name=""/>
+        <p:cNvGrpSpPr/>
+        <p:nvPr/>
+      </p:nvGrpSpPr>
+      <p:grpSpPr>
+        <a:xfrm>
+          <a:off x="0" y="0"/>
+          <a:ext cx="0" cy="0"/>
+          <a:chOff x="0" y="0"/>
+          <a:chExt cx="0" cy="0"/>
+        </a:xfrm>
+      </p:grpSpPr>
+      <p:sp>
+        <p:nvSpPr>
+          <p:cNvPr id="2" name="Espaço Reservado para Cabeçalho 1"/>
+          <p:cNvSpPr>
+            <a:spLocks noGrp="1"/>
+          </p:cNvSpPr>
+          <p:nvPr>
+            <p:ph type="hdr" sz="quarter"/>
+          </p:nvPr>
+        </p:nvSpPr>
+        <p:spPr>
+          <a:xfrm>
+            <a:off x="0" y="0"/>
+            <a:ext cx="2971800" cy="457200"/>
+          </a:xfrm>
+          <a:prstGeom prst="rect">
+            <a:avLst/>
+          </a:prstGeom>
+        </p:spPr>
+        <p:txBody>
+          <a:bodyPr vert="horz" lIns="91440" tIns="45720" rIns="91440" bIns="45720" rtlCol="0"/>
+          <a:lstStyle>
+            <a:lvl1pPr algn="l">
+              <a:defRPr sz="1200"/>
+            </a:lvl1pPr>
+          </a:lstStyle>
+          <a:p>
+            <a:endParaRPr lang="pt-BR"/>
+          </a:p>
+        </p:txBody>
+      </p:sp>
+      <p:sp>
+        <p:nvSpPr>
+          <p:cNvPr id="3" name="Espaço Reservado para Data 2"/>
+          <p:cNvSpPr>
+            <a:spLocks noGrp="1"/>
+          </p:cNvSpPr>
+          <p:nvPr>
+            <p:ph type="dt" idx="1"/>
+          </p:nvPr>
+        </p:nvSpPr>
+        <p:spPr>
+          <a:xfrm>
+            <a:off x="3884613" y="0"/>
+            <a:ext cx="2971800" cy="457200"/>
+          </a:xfrm>
+          <a:prstGeom prst="rect">
+            <a:avLst/>
+          </a:prstGeom>
+        </p:spPr>
+        <p:txBody>
+          <a:bodyPr vert="horz" lIns="91440" tIns="45720" rIns="91440" bIns="45720" rtlCol="0"/>
+          <a:lstStyle>
+            <a:lvl1pPr algn="r">
+              <a:defRPr sz="1200"/>
+            </a:lvl1pPr>
+          </a:lstStyle>
+          <a:p>
+            <a:fld id="{3F5D9F91-5035-469D-968F-FE3C304D0282}" type="datetimeFigureOut">
+              <a:rPr lang="pt-BR" smtClean="0"/>
+              <a:t>21/09/2018</a:t>
+            </a:fld>
+            <a:endParaRPr lang="pt-BR"/>
+          </a:p>
+        </p:txBody>
+      </p:sp>
+      <p:sp>
+        <p:nvSpPr>
+          <p:cNvPr id="4" name="Espaço Reservado para Imagem de Slide 3"/>
+          <p:cNvSpPr>
+            <a:spLocks noGrp="1" noRot="1" noChangeAspect="1"/>
+          </p:cNvSpPr>
+          <p:nvPr>
+            <p:ph type="sldImg" idx="2"/>
+          </p:nvPr>
+        </p:nvSpPr>
+        <p:spPr>
+          <a:xfrm>
+            <a:off x="1143000" y="685800"/>
+            <a:ext cx="4572000" cy="3429000"/>
+          </a:xfrm>
+          <a:prstGeom prst="rect">
+            <a:avLst/>
+          </a:prstGeom>
+          <a:noFill/>
+          <a:ln w="12700">
+            <a:solidFill>
+              <a:prstClr val="black"/>
+            </a:solidFill>
+          </a:ln>
+        </p:spPr>
+        <p:txBody>
+          <a:bodyPr vert="horz" lIns="91440" tIns="45720" rIns="91440" bIns="45720" rtlCol="0" anchor="ctr"/>
+          <a:lstStyle/>
+          <a:p>
+            <a:endParaRPr lang="pt-BR"/>
+          </a:p>
+        </p:txBody>
+      </p:sp>
+      <p:sp>
+        <p:nvSpPr>
+          <p:cNvPr id="5" name="Espaço Reservado para Anotações 4"/>
+          <p:cNvSpPr>
+            <a:spLocks noGrp="1"/>
+          </p:cNvSpPr>
+          <p:nvPr>
+            <p:ph type="body" sz="quarter" idx="3"/>
+          </p:nvPr>
+        </p:nvSpPr>
+        <p:spPr>
+          <a:xfrm>
+            <a:off x="685800" y="4343400"/>
+            <a:ext cx="5486400" cy="4114800"/>
+          </a:xfrm>
+          <a:prstGeom prst="rect">
+            <a:avLst/>
+          </a:prstGeom>
+        </p:spPr>
+        <p:txBody>
+          <a:bodyPr vert="horz" lIns="91440" tIns="45720" rIns="91440" bIns="45720" rtlCol="0"/>
+          <a:lstStyle/>
+          <a:p>
+            <a:pPr lvl="0"/>
+            <a:r>
+              <a:rPr lang="pt-BR" smtClean="0"/>
+              <a:t>Clique para editar o texto mestre</a:t>
+            </a:r>
+          </a:p>
+          <a:p>
+            <a:pPr lvl="1"/>
+            <a:r>
+              <a:rPr lang="pt-BR" smtClean="0"/>
+              <a:t>Segundo nível</a:t>
+            </a:r>
+          </a:p>
+          <a:p>
+            <a:pPr lvl="2"/>
+            <a:r>
+              <a:rPr lang="pt-BR" smtClean="0"/>
+              <a:t>Terceiro nível</a:t>
+            </a:r>
+          </a:p>
+          <a:p>
+            <a:pPr lvl="3"/>
+            <a:r>
+              <a:rPr lang="pt-BR" smtClean="0"/>
+              <a:t>Quarto nível</a:t>
+            </a:r>
+          </a:p>
+          <a:p>
+            <a:pPr lvl="4"/>
+            <a:r>
+              <a:rPr lang="pt-BR" smtClean="0"/>
+              <a:t>Quinto nível</a:t>
+            </a:r>
+            <a:endParaRPr lang="pt-BR"/>
+          </a:p>
+        </p:txBody>
+      </p:sp>
+      <p:sp>
+        <p:nvSpPr>
+          <p:cNvPr id="6" name="Espaço Reservado para Rodapé 5"/>
+          <p:cNvSpPr>
+            <a:spLocks noGrp="1"/>
+          </p:cNvSpPr>
+          <p:nvPr>
+            <p:ph type="ftr" sz="quarter" idx="4"/>
+          </p:nvPr>
+        </p:nvSpPr>
+        <p:spPr>
+          <a:xfrm>
+            <a:off x="0" y="8685213"/>
+            <a:ext cx="2971800" cy="457200"/>
+          </a:xfrm>
+          <a:prstGeom prst="rect">
+            <a:avLst/>
+          </a:prstGeom>
+        </p:spPr>
+        <p:txBody>
+          <a:bodyPr vert="horz" lIns="91440" tIns="45720" rIns="91440" bIns="45720" rtlCol="0" anchor="b"/>
+          <a:lstStyle>
+            <a:lvl1pPr algn="l">
+              <a:defRPr sz="1200"/>
+            </a:lvl1pPr>
+          </a:lstStyle>
+          <a:p>
+            <a:endParaRPr lang="pt-BR"/>
+          </a:p>
+        </p:txBody>
+      </p:sp>
+      <p:sp>
+        <p:nvSpPr>
+          <p:cNvPr id="7" name="Espaço Reservado para Número de Slide 6"/>
+          <p:cNvSpPr>
+            <a:spLocks noGrp="1"/>
+          </p:cNvSpPr>
+          <p:nvPr>
+            <p:ph type="sldNum" sz="quarter" idx="5"/>
+          </p:nvPr>
+        </p:nvSpPr>
+        <p:spPr>
+          <a:xfrm>
+            <a:off x="3884613" y="8685213"/>
+            <a:ext cx="2971800" cy="457200"/>
+          </a:xfrm>
+          <a:prstGeom prst="rect">
+            <a:avLst/>
+          </a:prstGeom>
+        </p:spPr>
+        <p:txBody>
+          <a:bodyPr vert="horz" lIns="91440" tIns="45720" rIns="91440" bIns="45720" rtlCol="0" anchor="b"/>
+          <a:lstStyle>
+            <a:lvl1pPr algn="r">
+              <a:defRPr sz="1200"/>
+            </a:lvl1pPr>
+          </a:lstStyle>
+          <a:p>
+            <a:fld id="{712E17E6-F46B-44DA-99F1-1EB897427454}" type="slidenum">
+              <a:rPr lang="pt-BR" smtClean="0"/>
+              <a:t>‹nº›</a:t>
+            </a:fld>
+            <a:endParaRPr lang="pt-BR"/>
+          </a:p>
+        </p:txBody>
+      </p:sp>
+    </p:spTree>
+    <p:extLst>
+      <p:ext uri="{BB962C8B-B14F-4D97-AF65-F5344CB8AC3E}">
+        <p14:creationId xmlns:p14="http://schemas.microsoft.com/office/powerpoint/2010/main" val="834276987"/>
+      </p:ext>
+    </p:extLst>
+  </p:cSld>
+  <p:clrMap bg1="lt1" tx1="dk1" bg2="lt2" tx2="dk2" accent1="accent1" accent2="accent2" accent3="accent3" accent4="accent4" accent5="accent5" accent6="accent6" hlink="hlink" folHlink="folHlink"/>
+  <p:notesStyle>
+    <a:lvl1pPr marL="0" algn="l" defTabSz="914400" rtl="0" eaLnBrk="1" latinLnBrk="0" hangingPunct="1">
+      <a:defRPr sz="1200" kern="1200">
+        <a:solidFill>
+          <a:schemeClr val="tx1"/>
+        </a:solidFill>
+        <a:latin typeface="+mn-lt"/>
+        <a:ea typeface="+mn-ea"/>
+        <a:cs typeface="+mn-cs"/>
+      </a:defRPr>
+    </a:lvl1pPr>
+    <a:lvl2pPr marL="457200" algn="l" defTabSz="914400" rtl="0" eaLnBrk="1" latinLnBrk="0" hangingPunct="1">
+      <a:defRPr sz="1200" kern="1200">
+        <a:solidFill>
+          <a:schemeClr val="tx1"/>
+        </a:solidFill>
+        <a:latin typeface="+mn-lt"/>
+        <a:ea typeface="+mn-ea"/>
+        <a:cs typeface="+mn-cs"/>
+      </a:defRPr>
+    </a:lvl2pPr>
+    <a:lvl3pPr marL="914400" algn="l" defTabSz="914400" rtl="0" eaLnBrk="1" latinLnBrk="0" hangingPunct="1">
+      <a:defRPr sz="1200" kern="1200">
+        <a:solidFill>
+          <a:schemeClr val="tx1"/>
+        </a:solidFill>
+        <a:latin typeface="+mn-lt"/>
+        <a:ea typeface="+mn-ea"/>
+        <a:cs typeface="+mn-cs"/>
+      </a:defRPr>
+    </a:lvl3pPr>
+    <a:lvl4pPr marL="1371600" algn="l" defTabSz="914400" rtl="0" eaLnBrk="1" latinLnBrk="0" hangingPunct="1">
+      <a:defRPr sz="1200" kern="1200">
+        <a:solidFill>
+          <a:schemeClr val="tx1"/>
+        </a:solidFill>
+        <a:latin typeface="+mn-lt"/>
+        <a:ea typeface="+mn-ea"/>
+        <a:cs typeface="+mn-cs"/>
+      </a:defRPr>
+    </a:lvl4pPr>
+    <a:lvl5pPr marL="1828800" algn="l" defTabSz="914400" rtl="0" eaLnBrk="1" latinLnBrk="0" hangingPunct="1">
+      <a:defRPr sz="1200" kern="1200">
+        <a:solidFill>
+          <a:schemeClr val="tx1"/>
+        </a:solidFill>
+        <a:latin typeface="+mn-lt"/>
+        <a:ea typeface="+mn-ea"/>
+        <a:cs typeface="+mn-cs"/>
+      </a:defRPr>
+    </a:lvl5pPr>
+    <a:lvl6pPr marL="2286000" algn="l" defTabSz="914400" rtl="0" eaLnBrk="1" latinLnBrk="0" hangingPunct="1">
+      <a:defRPr sz="1200" kern="1200">
+        <a:solidFill>
+          <a:schemeClr val="tx1"/>
+        </a:solidFill>
+        <a:latin typeface="+mn-lt"/>
+        <a:ea typeface="+mn-ea"/>
+        <a:cs typeface="+mn-cs"/>
+      </a:defRPr>
+    </a:lvl6pPr>
+    <a:lvl7pPr marL="2743200" algn="l" defTabSz="914400" rtl="0" eaLnBrk="1" latinLnBrk="0" hangingPunct="1">
+      <a:defRPr sz="1200" kern="1200">
+        <a:solidFill>
+          <a:schemeClr val="tx1"/>
+        </a:solidFill>
+        <a:latin typeface="+mn-lt"/>
+        <a:ea typeface="+mn-ea"/>
+        <a:cs typeface="+mn-cs"/>
+      </a:defRPr>
+    </a:lvl7pPr>
+    <a:lvl8pPr marL="3200400" algn="l" defTabSz="914400" rtl="0" eaLnBrk="1" latinLnBrk="0" hangingPunct="1">
+      <a:defRPr sz="1200" kern="1200">
+        <a:solidFill>
+          <a:schemeClr val="tx1"/>
+        </a:solidFill>
+        <a:latin typeface="+mn-lt"/>
+        <a:ea typeface="+mn-ea"/>
+        <a:cs typeface="+mn-cs"/>
+      </a:defRPr>
+    </a:lvl8pPr>
+    <a:lvl9pPr marL="3657600" algn="l" defTabSz="914400" rtl="0" eaLnBrk="1" latinLnBrk="0" hangingPunct="1">
+      <a:defRPr sz="1200" kern="1200">
+        <a:solidFill>
+          <a:schemeClr val="tx1"/>
+        </a:solidFill>
+        <a:latin typeface="+mn-lt"/>
+        <a:ea typeface="+mn-ea"/>
+        <a:cs typeface="+mn-cs"/>
+      </a:defRPr>
+    </a:lvl9pPr>
+  </p:notesStyle>
+</p:notesMaster>
+</file>
+
+<file path=ppt/notesSlides/notesSlide1.xml><?xml version="1.0" encoding="utf-8"?>
+<p:notes xmlns:a="http://schemas.openxmlformats.org/drawingml/2006/main" xmlns:r="http://schemas.openxmlformats.org/officeDocument/2006/relationships" xmlns:p="http://schemas.openxmlformats.org/presentationml/2006/main">
+  <p:cSld>
+    <p:spTree>
+      <p:nvGrpSpPr>
+        <p:cNvPr id="1" name=""/>
+        <p:cNvGrpSpPr/>
+        <p:nvPr/>
+      </p:nvGrpSpPr>
+      <p:grpSpPr>
+        <a:xfrm>
+          <a:off x="0" y="0"/>
+          <a:ext cx="0" cy="0"/>
+          <a:chOff x="0" y="0"/>
+          <a:chExt cx="0" cy="0"/>
+        </a:xfrm>
+      </p:grpSpPr>
+      <p:sp>
+        <p:nvSpPr>
+          <p:cNvPr id="2" name="Espaço Reservado para Imagem de Slide 1"/>
+          <p:cNvSpPr>
+            <a:spLocks noGrp="1" noRot="1" noChangeAspect="1"/>
+          </p:cNvSpPr>
+          <p:nvPr>
+            <p:ph type="sldImg"/>
+          </p:nvPr>
+        </p:nvSpPr>
+        <p:spPr/>
+      </p:sp>
+      <p:sp>
+        <p:nvSpPr>
+          <p:cNvPr id="3" name="Espaço Reservado para Anotações 2"/>
+          <p:cNvSpPr>
+            <a:spLocks noGrp="1"/>
+          </p:cNvSpPr>
+          <p:nvPr>
+            <p:ph type="body" idx="1"/>
+          </p:nvPr>
+        </p:nvSpPr>
+        <p:spPr/>
+        <p:txBody>
+          <a:bodyPr/>
+          <a:lstStyle/>
+          <a:p>
+            <a:endParaRPr lang="pt-BR" dirty="0"/>
+          </a:p>
+        </p:txBody>
+      </p:sp>
+      <p:sp>
+        <p:nvSpPr>
+          <p:cNvPr id="4" name="Espaço Reservado para Número de Slide 3"/>
+          <p:cNvSpPr>
+            <a:spLocks noGrp="1"/>
+          </p:cNvSpPr>
+          <p:nvPr>
+            <p:ph type="sldNum" sz="quarter" idx="10"/>
+          </p:nvPr>
+        </p:nvSpPr>
+        <p:spPr/>
+        <p:txBody>
+          <a:bodyPr/>
+          <a:lstStyle/>
+          <a:p>
+            <a:fld id="{712E17E6-F46B-44DA-99F1-1EB897427454}" type="slidenum">
+              <a:rPr lang="pt-BR" smtClean="0"/>
+              <a:t>16</a:t>
+            </a:fld>
+            <a:endParaRPr lang="pt-BR"/>
+          </a:p>
+        </p:txBody>
+      </p:sp>
+    </p:spTree>
+    <p:extLst>
+      <p:ext uri="{BB962C8B-B14F-4D97-AF65-F5344CB8AC3E}">
+        <p14:creationId xmlns:p14="http://schemas.microsoft.com/office/powerpoint/2010/main" val="660445029"/>
+      </p:ext>
+    </p:extLst>
+  </p:cSld>
+  <p:clrMapOvr>
+    <a:masterClrMapping/>
+  </p:clrMapOvr>
+</p:notes>
+</file>
+
 <file path=ppt/slideLayouts/slideLayout1.xml><?xml version="1.0" encoding="utf-8"?>
 <p:sldLayout xmlns:a="http://schemas.openxmlformats.org/drawingml/2006/main" xmlns:r="http://schemas.openxmlformats.org/officeDocument/2006/relationships" xmlns:p="http://schemas.openxmlformats.org/presentationml/2006/main" type="title" preserve="1">
   <p:cSld name="Slide de título">
@@ -40525,7 +40962,7 @@
           <a:p>
             <a:fld id="{6170734A-4B5A-4F3B-B573-1E93A2DEC51B}" type="datetimeFigureOut">
               <a:rPr lang="pt-BR" smtClean="0"/>
-              <a:t>17/09/2018</a:t>
+              <a:t>21/09/2018</a:t>
             </a:fld>
             <a:endParaRPr lang="pt-BR"/>
           </a:p>
@@ -40690,7 +41127,7 @@
           <a:p>
             <a:fld id="{6170734A-4B5A-4F3B-B573-1E93A2DEC51B}" type="datetimeFigureOut">
               <a:rPr lang="pt-BR" smtClean="0"/>
-              <a:t>17/09/2018</a:t>
+              <a:t>21/09/2018</a:t>
             </a:fld>
             <a:endParaRPr lang="pt-BR"/>
           </a:p>
@@ -40865,7 +41302,7 @@
           <a:p>
             <a:fld id="{6170734A-4B5A-4F3B-B573-1E93A2DEC51B}" type="datetimeFigureOut">
               <a:rPr lang="pt-BR" smtClean="0"/>
-              <a:t>17/09/2018</a:t>
+              <a:t>21/09/2018</a:t>
             </a:fld>
             <a:endParaRPr lang="pt-BR"/>
           </a:p>
@@ -41048,7 +41485,7 @@
           <a:p>
             <a:fld id="{6170734A-4B5A-4F3B-B573-1E93A2DEC51B}" type="datetimeFigureOut">
               <a:rPr lang="pt-BR" smtClean="0"/>
-              <a:t>17/09/2018</a:t>
+              <a:t>21/09/2018</a:t>
             </a:fld>
             <a:endParaRPr lang="pt-BR"/>
           </a:p>
@@ -41310,7 +41747,7 @@
           <a:p>
             <a:fld id="{6170734A-4B5A-4F3B-B573-1E93A2DEC51B}" type="datetimeFigureOut">
               <a:rPr lang="pt-BR" smtClean="0"/>
-              <a:t>17/09/2018</a:t>
+              <a:t>21/09/2018</a:t>
             </a:fld>
             <a:endParaRPr lang="pt-BR"/>
           </a:p>
@@ -41658,7 +42095,7 @@
           <a:p>
             <a:fld id="{6170734A-4B5A-4F3B-B573-1E93A2DEC51B}" type="datetimeFigureOut">
               <a:rPr lang="pt-BR" smtClean="0"/>
-              <a:t>17/09/2018</a:t>
+              <a:t>21/09/2018</a:t>
             </a:fld>
             <a:endParaRPr lang="pt-BR"/>
           </a:p>
@@ -41966,7 +42403,7 @@
           <a:p>
             <a:fld id="{6170734A-4B5A-4F3B-B573-1E93A2DEC51B}" type="datetimeFigureOut">
               <a:rPr lang="pt-BR" smtClean="0"/>
-              <a:t>17/09/2018</a:t>
+              <a:t>21/09/2018</a:t>
             </a:fld>
             <a:endParaRPr lang="pt-BR"/>
           </a:p>
@@ -42193,7 +42630,7 @@
           <a:p>
             <a:fld id="{6170734A-4B5A-4F3B-B573-1E93A2DEC51B}" type="datetimeFigureOut">
               <a:rPr lang="pt-BR" smtClean="0"/>
-              <a:t>17/09/2018</a:t>
+              <a:t>21/09/2018</a:t>
             </a:fld>
             <a:endParaRPr lang="pt-BR"/>
           </a:p>
@@ -42283,7 +42720,7 @@
           <a:p>
             <a:fld id="{6170734A-4B5A-4F3B-B573-1E93A2DEC51B}" type="datetimeFigureOut">
               <a:rPr lang="pt-BR" smtClean="0"/>
-              <a:t>17/09/2018</a:t>
+              <a:t>21/09/2018</a:t>
             </a:fld>
             <a:endParaRPr lang="pt-BR"/>
           </a:p>
@@ -42571,7 +43008,7 @@
           <a:p>
             <a:fld id="{6170734A-4B5A-4F3B-B573-1E93A2DEC51B}" type="datetimeFigureOut">
               <a:rPr lang="pt-BR" smtClean="0"/>
-              <a:t>17/09/2018</a:t>
+              <a:t>21/09/2018</a:t>
             </a:fld>
             <a:endParaRPr lang="pt-BR"/>
           </a:p>
@@ -42840,7 +43277,7 @@
           <a:p>
             <a:fld id="{6170734A-4B5A-4F3B-B573-1E93A2DEC51B}" type="datetimeFigureOut">
               <a:rPr lang="pt-BR" smtClean="0"/>
-              <a:t>17/09/2018</a:t>
+              <a:t>21/09/2018</a:t>
             </a:fld>
             <a:endParaRPr lang="pt-BR"/>
           </a:p>
@@ -43050,7 +43487,7 @@
           <a:p>
             <a:fld id="{6170734A-4B5A-4F3B-B573-1E93A2DEC51B}" type="datetimeFigureOut">
               <a:rPr lang="pt-BR" smtClean="0"/>
-              <a:t>17/09/2018</a:t>
+              <a:t>21/09/2018</a:t>
             </a:fld>
             <a:endParaRPr lang="pt-BR"/>
           </a:p>
@@ -44566,8 +45003,8 @@
         </p:blipFill>
         <p:spPr bwMode="auto">
           <a:xfrm>
-            <a:off x="0" y="908720"/>
-            <a:ext cx="9144000" cy="5949280"/>
+            <a:off x="107504" y="908720"/>
+            <a:ext cx="8928992" cy="5760640"/>
           </a:xfrm>
           <a:prstGeom prst="rect">
             <a:avLst/>
@@ -44807,7 +45244,12 @@
             <p:ph type="title"/>
           </p:nvPr>
         </p:nvSpPr>
-        <p:spPr/>
+        <p:spPr>
+          <a:xfrm>
+            <a:off x="437024" y="171231"/>
+            <a:ext cx="8229600" cy="764704"/>
+          </a:xfrm>
+        </p:spPr>
         <p:txBody>
           <a:bodyPr/>
           <a:lstStyle/>
@@ -44821,25 +45263,6 @@
               <a:t>baklog</a:t>
             </a:r>
             <a:endParaRPr lang="pt-BR" dirty="0"/>
-          </a:p>
-        </p:txBody>
-      </p:sp>
-      <p:sp>
-        <p:nvSpPr>
-          <p:cNvPr id="3" name="Espaço Reservado para Conteúdo 2"/>
-          <p:cNvSpPr>
-            <a:spLocks noGrp="1"/>
-          </p:cNvSpPr>
-          <p:nvPr>
-            <p:ph idx="1"/>
-          </p:nvPr>
-        </p:nvSpPr>
-        <p:spPr/>
-        <p:txBody>
-          <a:bodyPr/>
-          <a:lstStyle/>
-          <a:p>
-            <a:endParaRPr lang="pt-BR"/>
           </a:p>
         </p:txBody>
       </p:sp>
@@ -44887,6 +45310,1026 @@
           </a:extLst>
         </p:spPr>
       </p:pic>
+      <p:graphicFrame>
+        <p:nvGraphicFramePr>
+          <p:cNvPr id="9" name="Espaço Reservado para Conteúdo 8"/>
+          <p:cNvGraphicFramePr>
+            <a:graphicFrameLocks noGrp="1"/>
+          </p:cNvGraphicFramePr>
+          <p:nvPr>
+            <p:ph idx="1"/>
+            <p:extLst>
+              <p:ext uri="{D42A27DB-BD31-4B8C-83A1-F6EECF244321}">
+                <p14:modId xmlns:p14="http://schemas.microsoft.com/office/powerpoint/2010/main" val="729266373"/>
+              </p:ext>
+            </p:extLst>
+          </p:nvPr>
+        </p:nvGraphicFramePr>
+        <p:xfrm>
+          <a:off x="107505" y="980730"/>
+          <a:ext cx="8935143" cy="5501210"/>
+        </p:xfrm>
+        <a:graphic>
+          <a:graphicData uri="http://schemas.openxmlformats.org/drawingml/2006/table">
+            <a:tbl>
+              <a:tblPr firstRow="1" bandRow="1">
+                <a:tableStyleId>{5C22544A-7EE6-4342-B048-85BDC9FD1C3A}</a:tableStyleId>
+              </a:tblPr>
+              <a:tblGrid>
+                <a:gridCol w="558501"/>
+                <a:gridCol w="5238155"/>
+                <a:gridCol w="703633"/>
+                <a:gridCol w="1563628"/>
+                <a:gridCol w="871226"/>
+              </a:tblGrid>
+              <a:tr h="550121">
+                <a:tc>
+                  <a:txBody>
+                    <a:bodyPr/>
+                    <a:lstStyle/>
+                    <a:p>
+                      <a:pPr algn="ctr" fontAlgn="ctr"/>
+                      <a:r>
+                        <a:rPr lang="pt-BR" sz="1000" b="1" i="0" u="none" strike="noStrike" dirty="0" err="1">
+                          <a:solidFill>
+                            <a:srgbClr val="000000"/>
+                          </a:solidFill>
+                          <a:effectLst/>
+                          <a:latin typeface="Calibri"/>
+                        </a:rPr>
+                        <a:t>Nro</a:t>
+                      </a:r>
+                      <a:endParaRPr lang="pt-BR" sz="1000" b="1" i="0" u="none" strike="noStrike" dirty="0">
+                        <a:solidFill>
+                          <a:srgbClr val="000000"/>
+                        </a:solidFill>
+                        <a:effectLst/>
+                        <a:latin typeface="Calibri"/>
+                      </a:endParaRPr>
+                    </a:p>
+                  </a:txBody>
+                  <a:tcPr marL="0" marR="0" marT="0" marB="0" anchor="ctr"/>
+                </a:tc>
+                <a:tc>
+                  <a:txBody>
+                    <a:bodyPr/>
+                    <a:lstStyle/>
+                    <a:p>
+                      <a:pPr algn="l" fontAlgn="ctr"/>
+                      <a:r>
+                        <a:rPr lang="pt-BR" sz="1000" b="1" i="0" u="none" strike="noStrike">
+                          <a:solidFill>
+                            <a:srgbClr val="000000"/>
+                          </a:solidFill>
+                          <a:effectLst/>
+                          <a:latin typeface="Calibri"/>
+                        </a:rPr>
+                        <a:t>Descrição</a:t>
+                      </a:r>
+                    </a:p>
+                  </a:txBody>
+                  <a:tcPr marL="0" marR="0" marT="0" marB="0" anchor="ctr"/>
+                </a:tc>
+                <a:tc>
+                  <a:txBody>
+                    <a:bodyPr/>
+                    <a:lstStyle/>
+                    <a:p>
+                      <a:pPr algn="l" fontAlgn="ctr"/>
+                      <a:r>
+                        <a:rPr lang="pt-BR" sz="1000" b="1" i="0" u="none" strike="noStrike" dirty="0">
+                          <a:solidFill>
+                            <a:srgbClr val="000000"/>
+                          </a:solidFill>
+                          <a:effectLst/>
+                          <a:latin typeface="Calibri"/>
+                        </a:rPr>
+                        <a:t>Status</a:t>
+                      </a:r>
+                    </a:p>
+                  </a:txBody>
+                  <a:tcPr marL="0" marR="0" marT="0" marB="0" anchor="ctr"/>
+                </a:tc>
+                <a:tc>
+                  <a:txBody>
+                    <a:bodyPr/>
+                    <a:lstStyle/>
+                    <a:p>
+                      <a:pPr algn="ctr" fontAlgn="ctr"/>
+                      <a:r>
+                        <a:rPr lang="pt-BR" sz="1000" b="1" i="0" u="none" strike="noStrike">
+                          <a:solidFill>
+                            <a:srgbClr val="000000"/>
+                          </a:solidFill>
+                          <a:effectLst/>
+                          <a:latin typeface="Calibri"/>
+                        </a:rPr>
+                        <a:t>Size</a:t>
+                      </a:r>
+                    </a:p>
+                  </a:txBody>
+                  <a:tcPr marL="0" marR="0" marT="0" marB="0" anchor="ctr"/>
+                </a:tc>
+                <a:tc>
+                  <a:txBody>
+                    <a:bodyPr/>
+                    <a:lstStyle/>
+                    <a:p>
+                      <a:pPr algn="ctr" fontAlgn="ctr"/>
+                      <a:r>
+                        <a:rPr lang="pt-BR" sz="1000" b="1" i="0" u="none" strike="noStrike">
+                          <a:solidFill>
+                            <a:srgbClr val="000000"/>
+                          </a:solidFill>
+                          <a:effectLst/>
+                          <a:latin typeface="Calibri"/>
+                        </a:rPr>
+                        <a:t>Prioridade</a:t>
+                      </a:r>
+                    </a:p>
+                  </a:txBody>
+                  <a:tcPr marL="0" marR="0" marT="0" marB="0" anchor="ctr"/>
+                </a:tc>
+              </a:tr>
+              <a:tr h="550121">
+                <a:tc>
+                  <a:txBody>
+                    <a:bodyPr/>
+                    <a:lstStyle/>
+                    <a:p>
+                      <a:pPr algn="ctr" fontAlgn="ctr"/>
+                      <a:r>
+                        <a:rPr lang="pt-BR" sz="1000" b="0" i="0" u="none" strike="noStrike">
+                          <a:solidFill>
+                            <a:srgbClr val="000000"/>
+                          </a:solidFill>
+                          <a:effectLst/>
+                          <a:latin typeface="Calibri"/>
+                        </a:rPr>
+                        <a:t>U01</a:t>
+                      </a:r>
+                    </a:p>
+                  </a:txBody>
+                  <a:tcPr marL="0" marR="0" marT="0" marB="0" anchor="ctr"/>
+                </a:tc>
+                <a:tc>
+                  <a:txBody>
+                    <a:bodyPr/>
+                    <a:lstStyle/>
+                    <a:p>
+                      <a:pPr algn="l" fontAlgn="ctr"/>
+                      <a:r>
+                        <a:rPr lang="pt-BR" sz="1000" b="0" i="0" u="none" strike="noStrike">
+                          <a:solidFill>
+                            <a:srgbClr val="000000"/>
+                          </a:solidFill>
+                          <a:effectLst/>
+                          <a:latin typeface="Calibri"/>
+                        </a:rPr>
+                        <a:t>Eu, enquanto usuário operador, Quero permanecer logado quero consultar minha lista de lembretes</a:t>
+                      </a:r>
+                    </a:p>
+                  </a:txBody>
+                  <a:tcPr marL="0" marR="0" marT="0" marB="0" anchor="ctr"/>
+                </a:tc>
+                <a:tc>
+                  <a:txBody>
+                    <a:bodyPr/>
+                    <a:lstStyle/>
+                    <a:p>
+                      <a:pPr algn="l" fontAlgn="ctr"/>
+                      <a:r>
+                        <a:rPr lang="pt-BR" sz="1000" b="0" i="0" u="none" strike="noStrike">
+                          <a:solidFill>
+                            <a:srgbClr val="000000"/>
+                          </a:solidFill>
+                          <a:effectLst/>
+                          <a:latin typeface="Calibri"/>
+                        </a:rPr>
+                        <a:t>Planned</a:t>
+                      </a:r>
+                    </a:p>
+                  </a:txBody>
+                  <a:tcPr marL="0" marR="0" marT="0" marB="0" anchor="ctr"/>
+                </a:tc>
+                <a:tc>
+                  <a:txBody>
+                    <a:bodyPr/>
+                    <a:lstStyle/>
+                    <a:p>
+                      <a:pPr algn="ctr" fontAlgn="ctr"/>
+                      <a:r>
+                        <a:rPr lang="pt-BR" sz="1000" b="0" i="0" u="none" strike="noStrike">
+                          <a:solidFill>
+                            <a:srgbClr val="000000"/>
+                          </a:solidFill>
+                          <a:effectLst/>
+                          <a:latin typeface="Calibri"/>
+                        </a:rPr>
+                        <a:t>6</a:t>
+                      </a:r>
+                    </a:p>
+                  </a:txBody>
+                  <a:tcPr marL="0" marR="0" marT="0" marB="0" anchor="ctr"/>
+                </a:tc>
+                <a:tc>
+                  <a:txBody>
+                    <a:bodyPr/>
+                    <a:lstStyle/>
+                    <a:p>
+                      <a:pPr algn="ctr" fontAlgn="ctr"/>
+                      <a:r>
+                        <a:rPr lang="pt-BR" sz="1000" b="0" i="0" u="none" strike="noStrike">
+                          <a:solidFill>
+                            <a:srgbClr val="000000"/>
+                          </a:solidFill>
+                          <a:effectLst/>
+                          <a:latin typeface="Calibri"/>
+                        </a:rPr>
+                        <a:t>1</a:t>
+                      </a:r>
+                    </a:p>
+                  </a:txBody>
+                  <a:tcPr marL="0" marR="0" marT="0" marB="0" anchor="ctr"/>
+                </a:tc>
+              </a:tr>
+              <a:tr h="550121">
+                <a:tc>
+                  <a:txBody>
+                    <a:bodyPr/>
+                    <a:lstStyle/>
+                    <a:p>
+                      <a:pPr algn="ctr" fontAlgn="ctr"/>
+                      <a:r>
+                        <a:rPr lang="pt-BR" sz="1000" b="0" i="0" u="none" strike="noStrike">
+                          <a:solidFill>
+                            <a:srgbClr val="000000"/>
+                          </a:solidFill>
+                          <a:effectLst/>
+                          <a:latin typeface="Calibri"/>
+                        </a:rPr>
+                        <a:t>U02</a:t>
+                      </a:r>
+                    </a:p>
+                  </a:txBody>
+                  <a:tcPr marL="0" marR="0" marT="0" marB="0" anchor="ctr"/>
+                </a:tc>
+                <a:tc>
+                  <a:txBody>
+                    <a:bodyPr/>
+                    <a:lstStyle/>
+                    <a:p>
+                      <a:pPr algn="l" fontAlgn="ctr"/>
+                      <a:r>
+                        <a:rPr lang="pt-BR" sz="1000" b="0" i="0" u="none" strike="noStrike">
+                          <a:solidFill>
+                            <a:srgbClr val="000000"/>
+                          </a:solidFill>
+                          <a:effectLst/>
+                          <a:latin typeface="Calibri"/>
+                        </a:rPr>
+                        <a:t>Eu, enquanto usuário operador, Quero poder consultar minhas notificações dos meus dispositivos pessoais.</a:t>
+                      </a:r>
+                    </a:p>
+                  </a:txBody>
+                  <a:tcPr marL="0" marR="0" marT="0" marB="0" anchor="ctr"/>
+                </a:tc>
+                <a:tc>
+                  <a:txBody>
+                    <a:bodyPr/>
+                    <a:lstStyle/>
+                    <a:p>
+                      <a:pPr algn="l" fontAlgn="ctr"/>
+                      <a:r>
+                        <a:rPr lang="pt-BR" sz="1000" b="0" i="0" u="none" strike="noStrike">
+                          <a:solidFill>
+                            <a:srgbClr val="000000"/>
+                          </a:solidFill>
+                          <a:effectLst/>
+                          <a:latin typeface="Calibri"/>
+                        </a:rPr>
+                        <a:t>Planned</a:t>
+                      </a:r>
+                    </a:p>
+                  </a:txBody>
+                  <a:tcPr marL="0" marR="0" marT="0" marB="0" anchor="ctr"/>
+                </a:tc>
+                <a:tc>
+                  <a:txBody>
+                    <a:bodyPr/>
+                    <a:lstStyle/>
+                    <a:p>
+                      <a:pPr algn="ctr" fontAlgn="ctr"/>
+                      <a:r>
+                        <a:rPr lang="pt-BR" sz="1000" b="0" i="0" u="none" strike="noStrike">
+                          <a:solidFill>
+                            <a:srgbClr val="000000"/>
+                          </a:solidFill>
+                          <a:effectLst/>
+                          <a:latin typeface="Calibri"/>
+                        </a:rPr>
+                        <a:t>6</a:t>
+                      </a:r>
+                    </a:p>
+                  </a:txBody>
+                  <a:tcPr marL="0" marR="0" marT="0" marB="0" anchor="ctr"/>
+                </a:tc>
+                <a:tc>
+                  <a:txBody>
+                    <a:bodyPr/>
+                    <a:lstStyle/>
+                    <a:p>
+                      <a:pPr algn="ctr" fontAlgn="ctr"/>
+                      <a:r>
+                        <a:rPr lang="pt-BR" sz="1000" b="0" i="0" u="none" strike="noStrike">
+                          <a:solidFill>
+                            <a:srgbClr val="000000"/>
+                          </a:solidFill>
+                          <a:effectLst/>
+                          <a:latin typeface="Calibri"/>
+                        </a:rPr>
+                        <a:t>2</a:t>
+                      </a:r>
+                    </a:p>
+                  </a:txBody>
+                  <a:tcPr marL="0" marR="0" marT="0" marB="0" anchor="ctr"/>
+                </a:tc>
+              </a:tr>
+              <a:tr h="550121">
+                <a:tc>
+                  <a:txBody>
+                    <a:bodyPr/>
+                    <a:lstStyle/>
+                    <a:p>
+                      <a:pPr algn="ctr" fontAlgn="ctr"/>
+                      <a:r>
+                        <a:rPr lang="pt-BR" sz="1000" b="0" i="0" u="none" strike="noStrike">
+                          <a:solidFill>
+                            <a:srgbClr val="000000"/>
+                          </a:solidFill>
+                          <a:effectLst/>
+                          <a:latin typeface="Calibri"/>
+                        </a:rPr>
+                        <a:t>U03</a:t>
+                      </a:r>
+                    </a:p>
+                  </a:txBody>
+                  <a:tcPr marL="0" marR="0" marT="0" marB="0" anchor="ctr"/>
+                </a:tc>
+                <a:tc>
+                  <a:txBody>
+                    <a:bodyPr/>
+                    <a:lstStyle/>
+                    <a:p>
+                      <a:pPr algn="l" fontAlgn="ctr"/>
+                      <a:r>
+                        <a:rPr lang="pt-BR" sz="1000" b="0" i="0" u="none" strike="noStrike">
+                          <a:solidFill>
+                            <a:srgbClr val="000000"/>
+                          </a:solidFill>
+                          <a:effectLst/>
+                          <a:latin typeface="Calibri"/>
+                        </a:rPr>
+                        <a:t>Eu, enquanto usuário operador, Quero ser notificado dos lembretes ativos.</a:t>
+                      </a:r>
+                    </a:p>
+                  </a:txBody>
+                  <a:tcPr marL="0" marR="0" marT="0" marB="0" anchor="ctr"/>
+                </a:tc>
+                <a:tc>
+                  <a:txBody>
+                    <a:bodyPr/>
+                    <a:lstStyle/>
+                    <a:p>
+                      <a:pPr algn="l" fontAlgn="ctr"/>
+                      <a:r>
+                        <a:rPr lang="pt-BR" sz="1000" b="0" i="0" u="none" strike="noStrike">
+                          <a:solidFill>
+                            <a:srgbClr val="000000"/>
+                          </a:solidFill>
+                          <a:effectLst/>
+                          <a:latin typeface="Calibri"/>
+                        </a:rPr>
+                        <a:t>Planned</a:t>
+                      </a:r>
+                    </a:p>
+                  </a:txBody>
+                  <a:tcPr marL="0" marR="0" marT="0" marB="0" anchor="ctr"/>
+                </a:tc>
+                <a:tc>
+                  <a:txBody>
+                    <a:bodyPr/>
+                    <a:lstStyle/>
+                    <a:p>
+                      <a:pPr algn="ctr" fontAlgn="ctr"/>
+                      <a:r>
+                        <a:rPr lang="pt-BR" sz="1000" b="0" i="0" u="none" strike="noStrike">
+                          <a:solidFill>
+                            <a:srgbClr val="000000"/>
+                          </a:solidFill>
+                          <a:effectLst/>
+                          <a:latin typeface="Calibri"/>
+                        </a:rPr>
+                        <a:t>4</a:t>
+                      </a:r>
+                    </a:p>
+                  </a:txBody>
+                  <a:tcPr marL="0" marR="0" marT="0" marB="0" anchor="ctr"/>
+                </a:tc>
+                <a:tc>
+                  <a:txBody>
+                    <a:bodyPr/>
+                    <a:lstStyle/>
+                    <a:p>
+                      <a:pPr algn="ctr" fontAlgn="ctr"/>
+                      <a:r>
+                        <a:rPr lang="pt-BR" sz="1000" b="0" i="0" u="none" strike="noStrike">
+                          <a:solidFill>
+                            <a:srgbClr val="000000"/>
+                          </a:solidFill>
+                          <a:effectLst/>
+                          <a:latin typeface="Calibri"/>
+                        </a:rPr>
+                        <a:t>3</a:t>
+                      </a:r>
+                    </a:p>
+                  </a:txBody>
+                  <a:tcPr marL="0" marR="0" marT="0" marB="0" anchor="ctr"/>
+                </a:tc>
+              </a:tr>
+              <a:tr h="550121">
+                <a:tc>
+                  <a:txBody>
+                    <a:bodyPr/>
+                    <a:lstStyle/>
+                    <a:p>
+                      <a:pPr algn="ctr" fontAlgn="ctr"/>
+                      <a:r>
+                        <a:rPr lang="pt-BR" sz="1000" b="0" i="0" u="none" strike="noStrike">
+                          <a:solidFill>
+                            <a:srgbClr val="000000"/>
+                          </a:solidFill>
+                          <a:effectLst/>
+                          <a:latin typeface="Calibri"/>
+                        </a:rPr>
+                        <a:t>U04</a:t>
+                      </a:r>
+                    </a:p>
+                  </a:txBody>
+                  <a:tcPr marL="0" marR="0" marT="0" marB="0" anchor="ctr"/>
+                </a:tc>
+                <a:tc>
+                  <a:txBody>
+                    <a:bodyPr/>
+                    <a:lstStyle/>
+                    <a:p>
+                      <a:pPr algn="l" fontAlgn="ctr"/>
+                      <a:r>
+                        <a:rPr lang="pt-BR" sz="1000" b="0" i="0" u="none" strike="noStrike">
+                          <a:solidFill>
+                            <a:srgbClr val="000000"/>
+                          </a:solidFill>
+                          <a:effectLst/>
+                          <a:latin typeface="Calibri"/>
+                        </a:rPr>
+                        <a:t>Eu, enquanto usuário operador, Quero poder realizar uma ação quando quando receber uma notificação.</a:t>
+                      </a:r>
+                    </a:p>
+                  </a:txBody>
+                  <a:tcPr marL="0" marR="0" marT="0" marB="0" anchor="ctr"/>
+                </a:tc>
+                <a:tc>
+                  <a:txBody>
+                    <a:bodyPr/>
+                    <a:lstStyle/>
+                    <a:p>
+                      <a:pPr algn="l" fontAlgn="ctr"/>
+                      <a:r>
+                        <a:rPr lang="pt-BR" sz="1000" b="0" i="0" u="none" strike="noStrike" dirty="0" err="1">
+                          <a:solidFill>
+                            <a:srgbClr val="000000"/>
+                          </a:solidFill>
+                          <a:effectLst/>
+                          <a:latin typeface="Calibri"/>
+                        </a:rPr>
+                        <a:t>Planned</a:t>
+                      </a:r>
+                      <a:endParaRPr lang="pt-BR" sz="1000" b="0" i="0" u="none" strike="noStrike" dirty="0">
+                        <a:solidFill>
+                          <a:srgbClr val="000000"/>
+                        </a:solidFill>
+                        <a:effectLst/>
+                        <a:latin typeface="Calibri"/>
+                      </a:endParaRPr>
+                    </a:p>
+                  </a:txBody>
+                  <a:tcPr marL="0" marR="0" marT="0" marB="0" anchor="ctr"/>
+                </a:tc>
+                <a:tc>
+                  <a:txBody>
+                    <a:bodyPr/>
+                    <a:lstStyle/>
+                    <a:p>
+                      <a:pPr algn="ctr" fontAlgn="ctr"/>
+                      <a:r>
+                        <a:rPr lang="pt-BR" sz="1000" b="0" i="0" u="none" strike="noStrike">
+                          <a:solidFill>
+                            <a:srgbClr val="000000"/>
+                          </a:solidFill>
+                          <a:effectLst/>
+                          <a:latin typeface="Calibri"/>
+                        </a:rPr>
+                        <a:t>2</a:t>
+                      </a:r>
+                    </a:p>
+                  </a:txBody>
+                  <a:tcPr marL="0" marR="0" marT="0" marB="0" anchor="ctr"/>
+                </a:tc>
+                <a:tc>
+                  <a:txBody>
+                    <a:bodyPr/>
+                    <a:lstStyle/>
+                    <a:p>
+                      <a:pPr algn="ctr" fontAlgn="ctr"/>
+                      <a:r>
+                        <a:rPr lang="pt-BR" sz="1000" b="0" i="0" u="none" strike="noStrike">
+                          <a:solidFill>
+                            <a:srgbClr val="000000"/>
+                          </a:solidFill>
+                          <a:effectLst/>
+                          <a:latin typeface="Calibri"/>
+                        </a:rPr>
+                        <a:t>4</a:t>
+                      </a:r>
+                    </a:p>
+                  </a:txBody>
+                  <a:tcPr marL="0" marR="0" marT="0" marB="0" anchor="ctr"/>
+                </a:tc>
+              </a:tr>
+              <a:tr h="550121">
+                <a:tc>
+                  <a:txBody>
+                    <a:bodyPr/>
+                    <a:lstStyle/>
+                    <a:p>
+                      <a:pPr algn="ctr" fontAlgn="ctr"/>
+                      <a:r>
+                        <a:rPr lang="pt-BR" sz="1000" b="0" i="0" u="none" strike="noStrike">
+                          <a:solidFill>
+                            <a:srgbClr val="000000"/>
+                          </a:solidFill>
+                          <a:effectLst/>
+                          <a:latin typeface="Calibri"/>
+                        </a:rPr>
+                        <a:t>U05</a:t>
+                      </a:r>
+                    </a:p>
+                  </a:txBody>
+                  <a:tcPr marL="0" marR="0" marT="0" marB="0" anchor="ctr"/>
+                </a:tc>
+                <a:tc>
+                  <a:txBody>
+                    <a:bodyPr/>
+                    <a:lstStyle/>
+                    <a:p>
+                      <a:pPr algn="l" fontAlgn="ctr"/>
+                      <a:r>
+                        <a:rPr lang="pt-BR" sz="1000" b="0" i="0" u="none" strike="noStrike">
+                          <a:solidFill>
+                            <a:srgbClr val="000000"/>
+                          </a:solidFill>
+                          <a:effectLst/>
+                          <a:latin typeface="Calibri"/>
+                        </a:rPr>
+                        <a:t>Eu, enquanto usuário professor. Quando notificado ser quiser, quero poder inserir o contúdo das minhas aulas</a:t>
+                      </a:r>
+                    </a:p>
+                  </a:txBody>
+                  <a:tcPr marL="0" marR="0" marT="0" marB="0" anchor="ctr"/>
+                </a:tc>
+                <a:tc>
+                  <a:txBody>
+                    <a:bodyPr/>
+                    <a:lstStyle/>
+                    <a:p>
+                      <a:pPr algn="l" fontAlgn="ctr"/>
+                      <a:r>
+                        <a:rPr lang="pt-BR" sz="1000" b="0" i="0" u="none" strike="noStrike">
+                          <a:solidFill>
+                            <a:srgbClr val="000000"/>
+                          </a:solidFill>
+                          <a:effectLst/>
+                          <a:latin typeface="Calibri"/>
+                        </a:rPr>
+                        <a:t>Planned</a:t>
+                      </a:r>
+                    </a:p>
+                  </a:txBody>
+                  <a:tcPr marL="0" marR="0" marT="0" marB="0" anchor="ctr"/>
+                </a:tc>
+                <a:tc>
+                  <a:txBody>
+                    <a:bodyPr/>
+                    <a:lstStyle/>
+                    <a:p>
+                      <a:pPr algn="ctr" fontAlgn="ctr"/>
+                      <a:r>
+                        <a:rPr lang="pt-BR" sz="1000" b="0" i="0" u="none" strike="noStrike">
+                          <a:solidFill>
+                            <a:srgbClr val="000000"/>
+                          </a:solidFill>
+                          <a:effectLst/>
+                          <a:latin typeface="Calibri"/>
+                        </a:rPr>
+                        <a:t>2</a:t>
+                      </a:r>
+                    </a:p>
+                  </a:txBody>
+                  <a:tcPr marL="0" marR="0" marT="0" marB="0" anchor="ctr"/>
+                </a:tc>
+                <a:tc>
+                  <a:txBody>
+                    <a:bodyPr/>
+                    <a:lstStyle/>
+                    <a:p>
+                      <a:pPr algn="ctr" fontAlgn="ctr"/>
+                      <a:r>
+                        <a:rPr lang="pt-BR" sz="1000" b="0" i="0" u="none" strike="noStrike">
+                          <a:solidFill>
+                            <a:srgbClr val="000000"/>
+                          </a:solidFill>
+                          <a:effectLst/>
+                          <a:latin typeface="Calibri"/>
+                        </a:rPr>
+                        <a:t>5</a:t>
+                      </a:r>
+                    </a:p>
+                  </a:txBody>
+                  <a:tcPr marL="0" marR="0" marT="0" marB="0" anchor="ctr"/>
+                </a:tc>
+              </a:tr>
+              <a:tr h="550121">
+                <a:tc>
+                  <a:txBody>
+                    <a:bodyPr/>
+                    <a:lstStyle/>
+                    <a:p>
+                      <a:pPr algn="ctr" fontAlgn="ctr"/>
+                      <a:r>
+                        <a:rPr lang="pt-BR" sz="1000" b="0" i="0" u="none" strike="noStrike">
+                          <a:solidFill>
+                            <a:srgbClr val="000000"/>
+                          </a:solidFill>
+                          <a:effectLst/>
+                          <a:latin typeface="Calibri"/>
+                        </a:rPr>
+                        <a:t>U06</a:t>
+                      </a:r>
+                    </a:p>
+                  </a:txBody>
+                  <a:tcPr marL="0" marR="0" marT="0" marB="0" anchor="ctr"/>
+                </a:tc>
+                <a:tc>
+                  <a:txBody>
+                    <a:bodyPr/>
+                    <a:lstStyle/>
+                    <a:p>
+                      <a:pPr algn="l" fontAlgn="ctr"/>
+                      <a:r>
+                        <a:rPr lang="pt-BR" sz="1000" b="0" i="0" u="none" strike="noStrike">
+                          <a:solidFill>
+                            <a:srgbClr val="000000"/>
+                          </a:solidFill>
+                          <a:effectLst/>
+                          <a:latin typeface="Calibri"/>
+                        </a:rPr>
+                        <a:t>Eu, enquanto usuário professor. Quando notificado ser quiser, quero poder realiza a chamada da minha turma</a:t>
+                      </a:r>
+                    </a:p>
+                  </a:txBody>
+                  <a:tcPr marL="0" marR="0" marT="0" marB="0" anchor="ctr"/>
+                </a:tc>
+                <a:tc>
+                  <a:txBody>
+                    <a:bodyPr/>
+                    <a:lstStyle/>
+                    <a:p>
+                      <a:pPr algn="l" fontAlgn="ctr"/>
+                      <a:r>
+                        <a:rPr lang="pt-BR" sz="1000" b="0" i="0" u="none" strike="noStrike">
+                          <a:solidFill>
+                            <a:srgbClr val="000000"/>
+                          </a:solidFill>
+                          <a:effectLst/>
+                          <a:latin typeface="Calibri"/>
+                        </a:rPr>
+                        <a:t>Planned</a:t>
+                      </a:r>
+                    </a:p>
+                  </a:txBody>
+                  <a:tcPr marL="0" marR="0" marT="0" marB="0" anchor="ctr"/>
+                </a:tc>
+                <a:tc>
+                  <a:txBody>
+                    <a:bodyPr/>
+                    <a:lstStyle/>
+                    <a:p>
+                      <a:pPr algn="ctr" fontAlgn="ctr"/>
+                      <a:r>
+                        <a:rPr lang="pt-BR" sz="1000" b="0" i="0" u="none" strike="noStrike">
+                          <a:solidFill>
+                            <a:srgbClr val="000000"/>
+                          </a:solidFill>
+                          <a:effectLst/>
+                          <a:latin typeface="Calibri"/>
+                        </a:rPr>
+                        <a:t>2</a:t>
+                      </a:r>
+                    </a:p>
+                  </a:txBody>
+                  <a:tcPr marL="0" marR="0" marT="0" marB="0" anchor="ctr"/>
+                </a:tc>
+                <a:tc>
+                  <a:txBody>
+                    <a:bodyPr/>
+                    <a:lstStyle/>
+                    <a:p>
+                      <a:pPr algn="ctr" fontAlgn="ctr"/>
+                      <a:r>
+                        <a:rPr lang="pt-BR" sz="1000" b="0" i="0" u="none" strike="noStrike">
+                          <a:solidFill>
+                            <a:srgbClr val="000000"/>
+                          </a:solidFill>
+                          <a:effectLst/>
+                          <a:latin typeface="Calibri"/>
+                        </a:rPr>
+                        <a:t>6</a:t>
+                      </a:r>
+                    </a:p>
+                  </a:txBody>
+                  <a:tcPr marL="0" marR="0" marT="0" marB="0" anchor="ctr"/>
+                </a:tc>
+              </a:tr>
+              <a:tr h="550121">
+                <a:tc>
+                  <a:txBody>
+                    <a:bodyPr/>
+                    <a:lstStyle/>
+                    <a:p>
+                      <a:pPr algn="ctr" fontAlgn="ctr"/>
+                      <a:r>
+                        <a:rPr lang="pt-BR" sz="1000" b="0" i="0" u="none" strike="noStrike">
+                          <a:solidFill>
+                            <a:srgbClr val="000000"/>
+                          </a:solidFill>
+                          <a:effectLst/>
+                          <a:latin typeface="Calibri"/>
+                        </a:rPr>
+                        <a:t>U07</a:t>
+                      </a:r>
+                    </a:p>
+                  </a:txBody>
+                  <a:tcPr marL="0" marR="0" marT="0" marB="0" anchor="ctr"/>
+                </a:tc>
+                <a:tc>
+                  <a:txBody>
+                    <a:bodyPr/>
+                    <a:lstStyle/>
+                    <a:p>
+                      <a:pPr algn="l" fontAlgn="ctr"/>
+                      <a:r>
+                        <a:rPr lang="pt-BR" sz="1000" b="0" i="0" u="none" strike="noStrike">
+                          <a:solidFill>
+                            <a:srgbClr val="000000"/>
+                          </a:solidFill>
+                          <a:effectLst/>
+                          <a:latin typeface="Calibri"/>
+                        </a:rPr>
+                        <a:t>Eu, enquanto usuário professor. Quando notificado ser quiser, quero poder postar as notas da minha turma</a:t>
+                      </a:r>
+                    </a:p>
+                  </a:txBody>
+                  <a:tcPr marL="0" marR="0" marT="0" marB="0" anchor="ctr"/>
+                </a:tc>
+                <a:tc>
+                  <a:txBody>
+                    <a:bodyPr/>
+                    <a:lstStyle/>
+                    <a:p>
+                      <a:pPr algn="l" fontAlgn="ctr"/>
+                      <a:r>
+                        <a:rPr lang="pt-BR" sz="1000" b="0" i="0" u="none" strike="noStrike">
+                          <a:solidFill>
+                            <a:srgbClr val="000000"/>
+                          </a:solidFill>
+                          <a:effectLst/>
+                          <a:latin typeface="Calibri"/>
+                        </a:rPr>
+                        <a:t>Planned</a:t>
+                      </a:r>
+                    </a:p>
+                  </a:txBody>
+                  <a:tcPr marL="0" marR="0" marT="0" marB="0" anchor="ctr"/>
+                </a:tc>
+                <a:tc>
+                  <a:txBody>
+                    <a:bodyPr/>
+                    <a:lstStyle/>
+                    <a:p>
+                      <a:pPr algn="ctr" fontAlgn="ctr"/>
+                      <a:r>
+                        <a:rPr lang="pt-BR" sz="1000" b="0" i="0" u="none" strike="noStrike">
+                          <a:solidFill>
+                            <a:srgbClr val="000000"/>
+                          </a:solidFill>
+                          <a:effectLst/>
+                          <a:latin typeface="Calibri"/>
+                        </a:rPr>
+                        <a:t>2</a:t>
+                      </a:r>
+                    </a:p>
+                  </a:txBody>
+                  <a:tcPr marL="0" marR="0" marT="0" marB="0" anchor="ctr"/>
+                </a:tc>
+                <a:tc>
+                  <a:txBody>
+                    <a:bodyPr/>
+                    <a:lstStyle/>
+                    <a:p>
+                      <a:pPr algn="ctr" fontAlgn="ctr"/>
+                      <a:r>
+                        <a:rPr lang="pt-BR" sz="1000" b="0" i="0" u="none" strike="noStrike">
+                          <a:solidFill>
+                            <a:srgbClr val="000000"/>
+                          </a:solidFill>
+                          <a:effectLst/>
+                          <a:latin typeface="Calibri"/>
+                        </a:rPr>
+                        <a:t>7</a:t>
+                      </a:r>
+                    </a:p>
+                  </a:txBody>
+                  <a:tcPr marL="0" marR="0" marT="0" marB="0" anchor="ctr"/>
+                </a:tc>
+              </a:tr>
+              <a:tr h="550121">
+                <a:tc>
+                  <a:txBody>
+                    <a:bodyPr/>
+                    <a:lstStyle/>
+                    <a:p>
+                      <a:pPr algn="ctr" fontAlgn="ctr"/>
+                      <a:r>
+                        <a:rPr lang="pt-BR" sz="1000" b="0" i="0" u="none" strike="noStrike">
+                          <a:solidFill>
+                            <a:srgbClr val="000000"/>
+                          </a:solidFill>
+                          <a:effectLst/>
+                          <a:latin typeface="Calibri"/>
+                        </a:rPr>
+                        <a:t>U08</a:t>
+                      </a:r>
+                    </a:p>
+                  </a:txBody>
+                  <a:tcPr marL="0" marR="0" marT="0" marB="0" anchor="ctr"/>
+                </a:tc>
+                <a:tc>
+                  <a:txBody>
+                    <a:bodyPr/>
+                    <a:lstStyle/>
+                    <a:p>
+                      <a:pPr algn="l" fontAlgn="ctr"/>
+                      <a:r>
+                        <a:rPr lang="pt-BR" sz="1000" b="0" i="0" u="none" strike="noStrike" dirty="0">
+                          <a:solidFill>
+                            <a:srgbClr val="000000"/>
+                          </a:solidFill>
+                          <a:effectLst/>
+                          <a:latin typeface="Calibri"/>
+                        </a:rPr>
+                        <a:t>Eu, enquanto usuário operador, Quero poder personalizar minhas notificações.</a:t>
+                      </a:r>
+                    </a:p>
+                  </a:txBody>
+                  <a:tcPr marL="0" marR="0" marT="0" marB="0" anchor="ctr"/>
+                </a:tc>
+                <a:tc>
+                  <a:txBody>
+                    <a:bodyPr/>
+                    <a:lstStyle/>
+                    <a:p>
+                      <a:pPr algn="l" fontAlgn="ctr"/>
+                      <a:r>
+                        <a:rPr lang="pt-BR" sz="1000" b="0" i="0" u="none" strike="noStrike">
+                          <a:solidFill>
+                            <a:srgbClr val="000000"/>
+                          </a:solidFill>
+                          <a:effectLst/>
+                          <a:latin typeface="Calibri"/>
+                        </a:rPr>
+                        <a:t>Planned</a:t>
+                      </a:r>
+                    </a:p>
+                  </a:txBody>
+                  <a:tcPr marL="0" marR="0" marT="0" marB="0" anchor="ctr"/>
+                </a:tc>
+                <a:tc>
+                  <a:txBody>
+                    <a:bodyPr/>
+                    <a:lstStyle/>
+                    <a:p>
+                      <a:pPr algn="ctr" fontAlgn="ctr"/>
+                      <a:r>
+                        <a:rPr lang="pt-BR" sz="1000" b="0" i="0" u="none" strike="noStrike">
+                          <a:solidFill>
+                            <a:srgbClr val="000000"/>
+                          </a:solidFill>
+                          <a:effectLst/>
+                          <a:latin typeface="Calibri"/>
+                        </a:rPr>
+                        <a:t>4</a:t>
+                      </a:r>
+                    </a:p>
+                  </a:txBody>
+                  <a:tcPr marL="0" marR="0" marT="0" marB="0" anchor="ctr"/>
+                </a:tc>
+                <a:tc>
+                  <a:txBody>
+                    <a:bodyPr/>
+                    <a:lstStyle/>
+                    <a:p>
+                      <a:pPr algn="ctr" fontAlgn="ctr"/>
+                      <a:r>
+                        <a:rPr lang="pt-BR" sz="1000" b="0" i="0" u="none" strike="noStrike" dirty="0">
+                          <a:solidFill>
+                            <a:srgbClr val="000000"/>
+                          </a:solidFill>
+                          <a:effectLst/>
+                          <a:latin typeface="Calibri"/>
+                        </a:rPr>
+                        <a:t>8</a:t>
+                      </a:r>
+                    </a:p>
+                  </a:txBody>
+                  <a:tcPr marL="0" marR="0" marT="0" marB="0" anchor="ctr"/>
+                </a:tc>
+              </a:tr>
+              <a:tr h="550121">
+                <a:tc>
+                  <a:txBody>
+                    <a:bodyPr/>
+                    <a:lstStyle/>
+                    <a:p>
+                      <a:endParaRPr lang="pt-BR"/>
+                    </a:p>
+                  </a:txBody>
+                  <a:tcPr/>
+                </a:tc>
+                <a:tc>
+                  <a:txBody>
+                    <a:bodyPr/>
+                    <a:lstStyle/>
+                    <a:p>
+                      <a:endParaRPr lang="pt-BR" dirty="0"/>
+                    </a:p>
+                  </a:txBody>
+                  <a:tcPr/>
+                </a:tc>
+                <a:tc>
+                  <a:txBody>
+                    <a:bodyPr/>
+                    <a:lstStyle/>
+                    <a:p>
+                      <a:endParaRPr lang="pt-BR"/>
+                    </a:p>
+                  </a:txBody>
+                  <a:tcPr/>
+                </a:tc>
+                <a:tc>
+                  <a:txBody>
+                    <a:bodyPr/>
+                    <a:lstStyle/>
+                    <a:p>
+                      <a:endParaRPr lang="pt-BR"/>
+                    </a:p>
+                  </a:txBody>
+                  <a:tcPr/>
+                </a:tc>
+                <a:tc>
+                  <a:txBody>
+                    <a:bodyPr/>
+                    <a:lstStyle/>
+                    <a:p>
+                      <a:endParaRPr lang="pt-BR" dirty="0"/>
+                    </a:p>
+                  </a:txBody>
+                  <a:tcPr/>
+                </a:tc>
+              </a:tr>
+            </a:tbl>
+          </a:graphicData>
+        </a:graphic>
+      </p:graphicFrame>
     </p:spTree>
     <p:extLst>
       <p:ext uri="{BB962C8B-B14F-4D97-AF65-F5344CB8AC3E}">
@@ -44924,6 +46367,44 @@
           <a:chExt cx="0" cy="0"/>
         </a:xfrm>
       </p:grpSpPr>
+      <p:sp>
+        <p:nvSpPr>
+          <p:cNvPr id="3" name="Retângulo 2"/>
+          <p:cNvSpPr/>
+          <p:nvPr/>
+        </p:nvSpPr>
+        <p:spPr>
+          <a:xfrm>
+            <a:off x="395536" y="1844824"/>
+            <a:ext cx="8568952" cy="1800199"/>
+          </a:xfrm>
+          <a:prstGeom prst="rect">
+            <a:avLst/>
+          </a:prstGeom>
+        </p:spPr>
+        <p:style>
+          <a:lnRef idx="1">
+            <a:schemeClr val="accent3"/>
+          </a:lnRef>
+          <a:fillRef idx="2">
+            <a:schemeClr val="accent3"/>
+          </a:fillRef>
+          <a:effectRef idx="1">
+            <a:schemeClr val="accent3"/>
+          </a:effectRef>
+          <a:fontRef idx="minor">
+            <a:schemeClr val="dk1"/>
+          </a:fontRef>
+        </p:style>
+        <p:txBody>
+          <a:bodyPr rtlCol="0" anchor="ctr"/>
+          <a:lstStyle/>
+          <a:p>
+            <a:pPr algn="ctr"/>
+            <a:endParaRPr lang="pt-BR" dirty="0"/>
+          </a:p>
+        </p:txBody>
+      </p:sp>
       <p:sp>
         <p:nvSpPr>
           <p:cNvPr id="2" name="Título 1"/>
@@ -45026,44 +46507,6 @@
       </p:pic>
       <p:sp>
         <p:nvSpPr>
-          <p:cNvPr id="3" name="Retângulo 2"/>
-          <p:cNvSpPr/>
-          <p:nvPr/>
-        </p:nvSpPr>
-        <p:spPr>
-          <a:xfrm>
-            <a:off x="395536" y="1844824"/>
-            <a:ext cx="8568952" cy="1800199"/>
-          </a:xfrm>
-          <a:prstGeom prst="rect">
-            <a:avLst/>
-          </a:prstGeom>
-        </p:spPr>
-        <p:style>
-          <a:lnRef idx="1">
-            <a:schemeClr val="accent3"/>
-          </a:lnRef>
-          <a:fillRef idx="2">
-            <a:schemeClr val="accent3"/>
-          </a:fillRef>
-          <a:effectRef idx="1">
-            <a:schemeClr val="accent3"/>
-          </a:effectRef>
-          <a:fontRef idx="minor">
-            <a:schemeClr val="dk1"/>
-          </a:fontRef>
-        </p:style>
-        <p:txBody>
-          <a:bodyPr rtlCol="0" anchor="ctr"/>
-          <a:lstStyle/>
-          <a:p>
-            <a:pPr algn="ctr"/>
-            <a:endParaRPr lang="pt-BR"/>
-          </a:p>
-        </p:txBody>
-      </p:sp>
-      <p:sp>
-        <p:nvSpPr>
           <p:cNvPr id="5" name="Retângulo 4"/>
           <p:cNvSpPr/>
           <p:nvPr/>
@@ -45097,6 +46540,246 @@
           <a:p>
             <a:pPr algn="ctr"/>
             <a:endParaRPr lang="pt-BR"/>
+          </a:p>
+        </p:txBody>
+      </p:sp>
+      <p:sp>
+        <p:nvSpPr>
+          <p:cNvPr id="13" name="CaixaDeTexto 12"/>
+          <p:cNvSpPr txBox="1"/>
+          <p:nvPr/>
+        </p:nvSpPr>
+        <p:spPr>
+          <a:xfrm>
+            <a:off x="4126303" y="6245036"/>
+            <a:ext cx="595035" cy="369332"/>
+          </a:xfrm>
+          <a:prstGeom prst="rect">
+            <a:avLst/>
+          </a:prstGeom>
+          <a:noFill/>
+        </p:spPr>
+        <p:txBody>
+          <a:bodyPr wrap="none" rtlCol="0">
+            <a:spAutoFit/>
+          </a:bodyPr>
+          <a:lstStyle/>
+          <a:p>
+            <a:r>
+              <a:rPr lang="pt-BR" dirty="0" smtClean="0"/>
+              <a:t>U01</a:t>
+            </a:r>
+            <a:endParaRPr lang="pt-BR" dirty="0"/>
+          </a:p>
+        </p:txBody>
+      </p:sp>
+      <p:sp>
+        <p:nvSpPr>
+          <p:cNvPr id="15" name="CaixaDeTexto 14"/>
+          <p:cNvSpPr txBox="1"/>
+          <p:nvPr/>
+        </p:nvSpPr>
+        <p:spPr>
+          <a:xfrm>
+            <a:off x="4138683" y="3748444"/>
+            <a:ext cx="595035" cy="369332"/>
+          </a:xfrm>
+          <a:prstGeom prst="rect">
+            <a:avLst/>
+          </a:prstGeom>
+          <a:noFill/>
+        </p:spPr>
+        <p:txBody>
+          <a:bodyPr wrap="none" rtlCol="0">
+            <a:spAutoFit/>
+          </a:bodyPr>
+          <a:lstStyle/>
+          <a:p>
+            <a:r>
+              <a:rPr lang="pt-BR" dirty="0" smtClean="0"/>
+              <a:t>U04</a:t>
+            </a:r>
+            <a:endParaRPr lang="pt-BR" dirty="0"/>
+          </a:p>
+        </p:txBody>
+      </p:sp>
+      <p:sp>
+        <p:nvSpPr>
+          <p:cNvPr id="16" name="CaixaDeTexto 15"/>
+          <p:cNvSpPr txBox="1"/>
+          <p:nvPr/>
+        </p:nvSpPr>
+        <p:spPr>
+          <a:xfrm>
+            <a:off x="4824529" y="2372414"/>
+            <a:ext cx="595035" cy="369332"/>
+          </a:xfrm>
+          <a:prstGeom prst="rect">
+            <a:avLst/>
+          </a:prstGeom>
+          <a:noFill/>
+        </p:spPr>
+        <p:txBody>
+          <a:bodyPr wrap="none" rtlCol="0">
+            <a:spAutoFit/>
+          </a:bodyPr>
+          <a:lstStyle/>
+          <a:p>
+            <a:r>
+              <a:rPr lang="pt-BR" dirty="0" smtClean="0"/>
+              <a:t>U07</a:t>
+            </a:r>
+            <a:endParaRPr lang="pt-BR" dirty="0"/>
+          </a:p>
+        </p:txBody>
+      </p:sp>
+      <p:sp>
+        <p:nvSpPr>
+          <p:cNvPr id="17" name="CaixaDeTexto 16"/>
+          <p:cNvSpPr txBox="1"/>
+          <p:nvPr/>
+        </p:nvSpPr>
+        <p:spPr>
+          <a:xfrm>
+            <a:off x="4126303" y="5496738"/>
+            <a:ext cx="595035" cy="369332"/>
+          </a:xfrm>
+          <a:prstGeom prst="rect">
+            <a:avLst/>
+          </a:prstGeom>
+          <a:noFill/>
+        </p:spPr>
+        <p:txBody>
+          <a:bodyPr wrap="none" rtlCol="0">
+            <a:spAutoFit/>
+          </a:bodyPr>
+          <a:lstStyle/>
+          <a:p>
+            <a:r>
+              <a:rPr lang="pt-BR" dirty="0" smtClean="0"/>
+              <a:t>U02</a:t>
+            </a:r>
+            <a:endParaRPr lang="pt-BR" dirty="0"/>
+          </a:p>
+        </p:txBody>
+      </p:sp>
+      <p:sp>
+        <p:nvSpPr>
+          <p:cNvPr id="18" name="CaixaDeTexto 17"/>
+          <p:cNvSpPr txBox="1"/>
+          <p:nvPr/>
+        </p:nvSpPr>
+        <p:spPr>
+          <a:xfrm>
+            <a:off x="3412075" y="2904954"/>
+            <a:ext cx="595035" cy="369332"/>
+          </a:xfrm>
+          <a:prstGeom prst="rect">
+            <a:avLst/>
+          </a:prstGeom>
+          <a:noFill/>
+        </p:spPr>
+        <p:txBody>
+          <a:bodyPr wrap="none" rtlCol="0">
+            <a:spAutoFit/>
+          </a:bodyPr>
+          <a:lstStyle/>
+          <a:p>
+            <a:r>
+              <a:rPr lang="pt-BR" dirty="0" smtClean="0"/>
+              <a:t>U05</a:t>
+            </a:r>
+            <a:endParaRPr lang="pt-BR" dirty="0"/>
+          </a:p>
+        </p:txBody>
+      </p:sp>
+      <p:sp>
+        <p:nvSpPr>
+          <p:cNvPr id="19" name="CaixaDeTexto 18"/>
+          <p:cNvSpPr txBox="1"/>
+          <p:nvPr/>
+        </p:nvSpPr>
+        <p:spPr>
+          <a:xfrm>
+            <a:off x="4151259" y="4643844"/>
+            <a:ext cx="595035" cy="369332"/>
+          </a:xfrm>
+          <a:prstGeom prst="rect">
+            <a:avLst/>
+          </a:prstGeom>
+          <a:noFill/>
+        </p:spPr>
+        <p:txBody>
+          <a:bodyPr wrap="none" rtlCol="0">
+            <a:spAutoFit/>
+          </a:bodyPr>
+          <a:lstStyle/>
+          <a:p>
+            <a:r>
+              <a:rPr lang="pt-BR" dirty="0" smtClean="0"/>
+              <a:t>U03</a:t>
+            </a:r>
+            <a:endParaRPr lang="pt-BR" dirty="0"/>
+          </a:p>
+        </p:txBody>
+      </p:sp>
+      <p:sp>
+        <p:nvSpPr>
+          <p:cNvPr id="20" name="CaixaDeTexto 19"/>
+          <p:cNvSpPr txBox="1"/>
+          <p:nvPr/>
+        </p:nvSpPr>
+        <p:spPr>
+          <a:xfrm>
+            <a:off x="5911552" y="2904954"/>
+            <a:ext cx="595035" cy="369332"/>
+          </a:xfrm>
+          <a:prstGeom prst="rect">
+            <a:avLst/>
+          </a:prstGeom>
+          <a:noFill/>
+        </p:spPr>
+        <p:txBody>
+          <a:bodyPr wrap="none" rtlCol="0">
+            <a:spAutoFit/>
+          </a:bodyPr>
+          <a:lstStyle/>
+          <a:p>
+            <a:r>
+              <a:rPr lang="pt-BR" dirty="0" smtClean="0"/>
+              <a:t>U06</a:t>
+            </a:r>
+            <a:endParaRPr lang="pt-BR" dirty="0"/>
+          </a:p>
+        </p:txBody>
+      </p:sp>
+      <p:sp>
+        <p:nvSpPr>
+          <p:cNvPr id="21" name="CaixaDeTexto 20"/>
+          <p:cNvSpPr txBox="1"/>
+          <p:nvPr/>
+        </p:nvSpPr>
+        <p:spPr>
+          <a:xfrm>
+            <a:off x="2123728" y="2162022"/>
+            <a:ext cx="595035" cy="369332"/>
+          </a:xfrm>
+          <a:prstGeom prst="rect">
+            <a:avLst/>
+          </a:prstGeom>
+          <a:noFill/>
+        </p:spPr>
+        <p:txBody>
+          <a:bodyPr wrap="none" rtlCol="0">
+            <a:spAutoFit/>
+          </a:bodyPr>
+          <a:lstStyle/>
+          <a:p>
+            <a:r>
+              <a:rPr lang="pt-BR" dirty="0" smtClean="0"/>
+              <a:t>U08</a:t>
+            </a:r>
+            <a:endParaRPr lang="pt-BR" dirty="0"/>
           </a:p>
         </p:txBody>
       </p:sp>
@@ -45147,7 +46830,12 @@
             <p:ph type="title"/>
           </p:nvPr>
         </p:nvSpPr>
-        <p:spPr/>
+        <p:spPr>
+          <a:xfrm>
+            <a:off x="457200" y="246531"/>
+            <a:ext cx="8229600" cy="806206"/>
+          </a:xfrm>
+        </p:spPr>
         <p:txBody>
           <a:bodyPr/>
           <a:lstStyle/>
@@ -45179,7 +46867,7 @@
           <a:bodyPr/>
           <a:lstStyle/>
           <a:p>
-            <a:endParaRPr lang="pt-BR"/>
+            <a:endParaRPr lang="pt-BR" dirty="0"/>
           </a:p>
         </p:txBody>
       </p:sp>
@@ -45192,7 +46880,7 @@
           <p:nvPr/>
         </p:nvPicPr>
         <p:blipFill rotWithShape="1">
-          <a:blip r:embed="rId2">
+          <a:blip r:embed="rId3">
             <a:extLst>
               <a:ext uri="{28A0092B-C50C-407E-A947-70E740481C1C}">
                 <a14:useLocalDpi xmlns:a14="http://schemas.microsoft.com/office/drawing/2010/main" val="0"/>
@@ -45223,6 +46911,68 @@
                   <a:srgbClr val="FFFFFF"/>
                 </a:solidFill>
               </a14:hiddenFill>
+            </a:ext>
+          </a:extLst>
+        </p:spPr>
+      </p:pic>
+      <p:pic>
+        <p:nvPicPr>
+          <p:cNvPr id="1026" name="Picture 2"/>
+          <p:cNvPicPr>
+            <a:picLocks noChangeAspect="1" noChangeArrowheads="1"/>
+          </p:cNvPicPr>
+          <p:nvPr/>
+        </p:nvPicPr>
+        <p:blipFill rotWithShape="1">
+          <a:blip r:embed="rId4">
+            <a:extLst>
+              <a:ext uri="{28A0092B-C50C-407E-A947-70E740481C1C}">
+                <a14:useLocalDpi xmlns:a14="http://schemas.microsoft.com/office/drawing/2010/main" val="0"/>
+              </a:ext>
+            </a:extLst>
+          </a:blip>
+          <a:srcRect l="788" t="11826" r="42849" b="8264"/>
+          <a:stretch/>
+        </p:blipFill>
+        <p:spPr bwMode="auto">
+          <a:xfrm>
+            <a:off x="123986" y="1379349"/>
+            <a:ext cx="8887393" cy="5331418"/>
+          </a:xfrm>
+          <a:prstGeom prst="rect">
+            <a:avLst/>
+          </a:prstGeom>
+          <a:noFill/>
+          <a:ln>
+            <a:noFill/>
+          </a:ln>
+          <a:effectLst/>
+          <a:extLst>
+            <a:ext uri="{909E8E84-426E-40DD-AFC4-6F175D3DCCD1}">
+              <a14:hiddenFill xmlns:a14="http://schemas.microsoft.com/office/drawing/2010/main">
+                <a:solidFill>
+                  <a:schemeClr val="accent1"/>
+                </a:solidFill>
+              </a14:hiddenFill>
+            </a:ext>
+            <a:ext uri="{91240B29-F687-4F45-9708-019B960494DF}">
+              <a14:hiddenLine xmlns:a14="http://schemas.microsoft.com/office/drawing/2010/main" w="9525">
+                <a:solidFill>
+                  <a:schemeClr val="tx1"/>
+                </a:solidFill>
+                <a:miter lim="800000"/>
+                <a:headEnd/>
+                <a:tailEnd/>
+              </a14:hiddenLine>
+            </a:ext>
+            <a:ext uri="{AF507438-7753-43E0-B8FC-AC1667EBCBE1}">
+              <a14:hiddenEffects xmlns:a14="http://schemas.microsoft.com/office/drawing/2010/main">
+                <a:effectLst>
+                  <a:outerShdw dist="35921" dir="2700000" algn="ctr" rotWithShape="0">
+                    <a:schemeClr val="bg2"/>
+                  </a:outerShdw>
+                </a:effectLst>
+              </a14:hiddenEffects>
             </a:ext>
           </a:extLst>
         </p:spPr>
@@ -45274,39 +47024,25 @@
             <p:ph type="title"/>
           </p:nvPr>
         </p:nvSpPr>
-        <p:spPr/>
+        <p:spPr>
+          <a:xfrm>
+            <a:off x="0" y="265611"/>
+            <a:ext cx="8932872" cy="1046617"/>
+          </a:xfrm>
+        </p:spPr>
         <p:txBody>
           <a:bodyPr/>
           <a:lstStyle/>
           <a:p>
             <a:r>
-              <a:rPr lang="pt-BR" dirty="0" smtClean="0"/>
+              <a:rPr lang="pt-BR" sz="4400" dirty="0" smtClean="0"/>
               <a:t>Metodologia de</a:t>
             </a:r>
             <a:r>
-              <a:rPr lang="pt-BR" baseline="0" dirty="0" smtClean="0"/>
+              <a:rPr lang="pt-BR" sz="4400" baseline="0" dirty="0" smtClean="0"/>
               <a:t> desenvolvimento</a:t>
             </a:r>
-            <a:endParaRPr lang="pt-BR" dirty="0"/>
-          </a:p>
-        </p:txBody>
-      </p:sp>
-      <p:sp>
-        <p:nvSpPr>
-          <p:cNvPr id="3" name="Espaço Reservado para Conteúdo 2"/>
-          <p:cNvSpPr>
-            <a:spLocks noGrp="1"/>
-          </p:cNvSpPr>
-          <p:nvPr>
-            <p:ph idx="1"/>
-          </p:nvPr>
-        </p:nvSpPr>
-        <p:spPr/>
-        <p:txBody>
-          <a:bodyPr/>
-          <a:lstStyle/>
-          <a:p>
-            <a:endParaRPr lang="pt-BR" dirty="0"/>
+            <a:endParaRPr lang="pt-BR" sz="4400" dirty="0"/>
           </a:p>
         </p:txBody>
       </p:sp>
@@ -45354,6 +47090,78 @@
           </a:extLst>
         </p:spPr>
       </p:pic>
+      <p:pic>
+        <p:nvPicPr>
+          <p:cNvPr id="3074" name="Picture 2" descr="&quot;Ciclo Scrum&quot;">
+            <a:hlinkClick r:id="rId3"/>
+          </p:cNvPr>
+          <p:cNvPicPr>
+            <a:picLocks noChangeAspect="1" noChangeArrowheads="1"/>
+          </p:cNvPicPr>
+          <p:nvPr/>
+        </p:nvPicPr>
+        <p:blipFill>
+          <a:blip r:embed="rId4">
+            <a:extLst>
+              <a:ext uri="{28A0092B-C50C-407E-A947-70E740481C1C}">
+                <a14:useLocalDpi xmlns:a14="http://schemas.microsoft.com/office/drawing/2010/main" val="0"/>
+              </a:ext>
+            </a:extLst>
+          </a:blip>
+          <a:srcRect/>
+          <a:stretch>
+            <a:fillRect/>
+          </a:stretch>
+        </p:blipFill>
+        <p:spPr bwMode="auto">
+          <a:xfrm>
+            <a:off x="1574540" y="2564904"/>
+            <a:ext cx="5688632" cy="3133814"/>
+          </a:xfrm>
+          <a:prstGeom prst="rect">
+            <a:avLst/>
+          </a:prstGeom>
+          <a:noFill/>
+          <a:extLst>
+            <a:ext uri="{909E8E84-426E-40DD-AFC4-6F175D3DCCD1}">
+              <a14:hiddenFill xmlns:a14="http://schemas.microsoft.com/office/drawing/2010/main">
+                <a:solidFill>
+                  <a:srgbClr val="FFFFFF"/>
+                </a:solidFill>
+              </a14:hiddenFill>
+            </a:ext>
+          </a:extLst>
+        </p:spPr>
+      </p:pic>
+      <p:sp>
+        <p:nvSpPr>
+          <p:cNvPr id="5" name="CaixaDeTexto 4"/>
+          <p:cNvSpPr txBox="1"/>
+          <p:nvPr/>
+        </p:nvSpPr>
+        <p:spPr>
+          <a:xfrm flipH="1">
+            <a:off x="3770784" y="1845866"/>
+            <a:ext cx="1296144" cy="369332"/>
+          </a:xfrm>
+          <a:prstGeom prst="rect">
+            <a:avLst/>
+          </a:prstGeom>
+          <a:noFill/>
+        </p:spPr>
+        <p:txBody>
+          <a:bodyPr wrap="square" rtlCol="0">
+            <a:spAutoFit/>
+          </a:bodyPr>
+          <a:lstStyle/>
+          <a:p>
+            <a:r>
+              <a:rPr lang="pt-BR" b="1" cap="all" dirty="0"/>
+              <a:t>SCRUM</a:t>
+            </a:r>
+          </a:p>
+        </p:txBody>
+      </p:sp>
     </p:spTree>
     <p:extLst>
       <p:ext uri="{BB962C8B-B14F-4D97-AF65-F5344CB8AC3E}">
@@ -45967,7 +47775,12 @@
             <p:ph type="title"/>
           </p:nvPr>
         </p:nvSpPr>
-        <p:spPr/>
+        <p:spPr>
+          <a:xfrm>
+            <a:off x="457200" y="0"/>
+            <a:ext cx="8229600" cy="1124744"/>
+          </a:xfrm>
+        </p:spPr>
         <p:txBody>
           <a:bodyPr/>
           <a:lstStyle/>
@@ -45995,7 +47808,7 @@
           <a:bodyPr/>
           <a:lstStyle/>
           <a:p>
-            <a:endParaRPr lang="pt-BR"/>
+            <a:endParaRPr lang="pt-BR" dirty="0"/>
           </a:p>
         </p:txBody>
       </p:sp>
@@ -50952,4 +52765,289 @@
   <a:objectDefaults/>
   <a:extraClrSchemeLst/>
 </a:theme>
+</file>
+
+<file path=ppt/theme/theme2.xml><?xml version="1.0" encoding="utf-8"?>
+<a:theme xmlns:a="http://schemas.openxmlformats.org/drawingml/2006/main" name="Tema do Office">
+  <a:themeElements>
+    <a:clrScheme name="Escritório">
+      <a:dk1>
+        <a:sysClr val="windowText" lastClr="000000"/>
+      </a:dk1>
+      <a:lt1>
+        <a:sysClr val="window" lastClr="FFFFFF"/>
+      </a:lt1>
+      <a:dk2>
+        <a:srgbClr val="1F497D"/>
+      </a:dk2>
+      <a:lt2>
+        <a:srgbClr val="EEECE1"/>
+      </a:lt2>
+      <a:accent1>
+        <a:srgbClr val="4F81BD"/>
+      </a:accent1>
+      <a:accent2>
+        <a:srgbClr val="C0504D"/>
+      </a:accent2>
+      <a:accent3>
+        <a:srgbClr val="9BBB59"/>
+      </a:accent3>
+      <a:accent4>
+        <a:srgbClr val="8064A2"/>
+      </a:accent4>
+      <a:accent5>
+        <a:srgbClr val="4BACC6"/>
+      </a:accent5>
+      <a:accent6>
+        <a:srgbClr val="F79646"/>
+      </a:accent6>
+      <a:hlink>
+        <a:srgbClr val="0000FF"/>
+      </a:hlink>
+      <a:folHlink>
+        <a:srgbClr val="800080"/>
+      </a:folHlink>
+    </a:clrScheme>
+    <a:fontScheme name="Escritório">
+      <a:majorFont>
+        <a:latin typeface="Calibri"/>
+        <a:ea typeface=""/>
+        <a:cs typeface=""/>
+        <a:font script="Jpan" typeface="ＭＳ Ｐゴシック"/>
+        <a:font script="Hang" typeface="맑은 고딕"/>
+        <a:font script="Hans" typeface="宋体"/>
+        <a:font script="Hant" typeface="新細明體"/>
+        <a:font script="Arab" typeface="Times New Roman"/>
+        <a:font script="Hebr" typeface="Times New Roman"/>
+        <a:font script="Thai" typeface="Angsana New"/>
+        <a:font script="Ethi" typeface="Nyala"/>
+        <a:font script="Beng" typeface="Vrinda"/>
+        <a:font script="Gujr" typeface="Shruti"/>
+        <a:font script="Khmr" typeface="MoolBoran"/>
+        <a:font script="Knda" typeface="Tunga"/>
+        <a:font script="Guru" typeface="Raavi"/>
+        <a:font script="Cans" typeface="Euphemia"/>
+        <a:font script="Cher" typeface="Plantagenet Cherokee"/>
+        <a:font script="Yiii" typeface="Microsoft Yi Baiti"/>
+        <a:font script="Tibt" typeface="Microsoft Himalaya"/>
+        <a:font script="Thaa" typeface="MV Boli"/>
+        <a:font script="Deva" typeface="Mangal"/>
+        <a:font script="Telu" typeface="Gautami"/>
+        <a:font script="Taml" typeface="Latha"/>
+        <a:font script="Syrc" typeface="Estrangelo Edessa"/>
+        <a:font script="Orya" typeface="Kalinga"/>
+        <a:font script="Mlym" typeface="Kartika"/>
+        <a:font script="Laoo" typeface="DokChampa"/>
+        <a:font script="Sinh" typeface="Iskoola Pota"/>
+        <a:font script="Mong" typeface="Mongolian Baiti"/>
+        <a:font script="Viet" typeface="Times New Roman"/>
+        <a:font script="Uigh" typeface="Microsoft Uighur"/>
+        <a:font script="Geor" typeface="Sylfaen"/>
+      </a:majorFont>
+      <a:minorFont>
+        <a:latin typeface="Calibri"/>
+        <a:ea typeface=""/>
+        <a:cs typeface=""/>
+        <a:font script="Jpan" typeface="ＭＳ Ｐゴシック"/>
+        <a:font script="Hang" typeface="맑은 고딕"/>
+        <a:font script="Hans" typeface="宋体"/>
+        <a:font script="Hant" typeface="新細明體"/>
+        <a:font script="Arab" typeface="Arial"/>
+        <a:font script="Hebr" typeface="Arial"/>
+        <a:font script="Thai" typeface="Cordia New"/>
+        <a:font script="Ethi" typeface="Nyala"/>
+        <a:font script="Beng" typeface="Vrinda"/>
+        <a:font script="Gujr" typeface="Shruti"/>
+        <a:font script="Khmr" typeface="DaunPenh"/>
+        <a:font script="Knda" typeface="Tunga"/>
+        <a:font script="Guru" typeface="Raavi"/>
+        <a:font script="Cans" typeface="Euphemia"/>
+        <a:font script="Cher" typeface="Plantagenet Cherokee"/>
+        <a:font script="Yiii" typeface="Microsoft Yi Baiti"/>
+        <a:font script="Tibt" typeface="Microsoft Himalaya"/>
+        <a:font script="Thaa" typeface="MV Boli"/>
+        <a:font script="Deva" typeface="Mangal"/>
+        <a:font script="Telu" typeface="Gautami"/>
+        <a:font script="Taml" typeface="Latha"/>
+        <a:font script="Syrc" typeface="Estrangelo Edessa"/>
+        <a:font script="Orya" typeface="Kalinga"/>
+        <a:font script="Mlym" typeface="Kartika"/>
+        <a:font script="Laoo" typeface="DokChampa"/>
+        <a:font script="Sinh" typeface="Iskoola Pota"/>
+        <a:font script="Mong" typeface="Mongolian Baiti"/>
+        <a:font script="Viet" typeface="Arial"/>
+        <a:font script="Uigh" typeface="Microsoft Uighur"/>
+        <a:font script="Geor" typeface="Sylfaen"/>
+      </a:minorFont>
+    </a:fontScheme>
+    <a:fmtScheme name="Escritório">
+      <a:fillStyleLst>
+        <a:solidFill>
+          <a:schemeClr val="phClr"/>
+        </a:solidFill>
+        <a:gradFill rotWithShape="1">
+          <a:gsLst>
+            <a:gs pos="0">
+              <a:schemeClr val="phClr">
+                <a:tint val="50000"/>
+                <a:satMod val="300000"/>
+              </a:schemeClr>
+            </a:gs>
+            <a:gs pos="35000">
+              <a:schemeClr val="phClr">
+                <a:tint val="37000"/>
+                <a:satMod val="300000"/>
+              </a:schemeClr>
+            </a:gs>
+            <a:gs pos="100000">
+              <a:schemeClr val="phClr">
+                <a:tint val="15000"/>
+                <a:satMod val="350000"/>
+              </a:schemeClr>
+            </a:gs>
+          </a:gsLst>
+          <a:lin ang="16200000" scaled="1"/>
+        </a:gradFill>
+        <a:gradFill rotWithShape="1">
+          <a:gsLst>
+            <a:gs pos="0">
+              <a:schemeClr val="phClr">
+                <a:shade val="51000"/>
+                <a:satMod val="130000"/>
+              </a:schemeClr>
+            </a:gs>
+            <a:gs pos="80000">
+              <a:schemeClr val="phClr">
+                <a:shade val="93000"/>
+                <a:satMod val="130000"/>
+              </a:schemeClr>
+            </a:gs>
+            <a:gs pos="100000">
+              <a:schemeClr val="phClr">
+                <a:shade val="94000"/>
+                <a:satMod val="135000"/>
+              </a:schemeClr>
+            </a:gs>
+          </a:gsLst>
+          <a:lin ang="16200000" scaled="0"/>
+        </a:gradFill>
+      </a:fillStyleLst>
+      <a:lnStyleLst>
+        <a:ln w="9525" cap="flat" cmpd="sng" algn="ctr">
+          <a:solidFill>
+            <a:schemeClr val="phClr">
+              <a:shade val="95000"/>
+              <a:satMod val="105000"/>
+            </a:schemeClr>
+          </a:solidFill>
+          <a:prstDash val="solid"/>
+        </a:ln>
+        <a:ln w="25400" cap="flat" cmpd="sng" algn="ctr">
+          <a:solidFill>
+            <a:schemeClr val="phClr"/>
+          </a:solidFill>
+          <a:prstDash val="solid"/>
+        </a:ln>
+        <a:ln w="38100" cap="flat" cmpd="sng" algn="ctr">
+          <a:solidFill>
+            <a:schemeClr val="phClr"/>
+          </a:solidFill>
+          <a:prstDash val="solid"/>
+        </a:ln>
+      </a:lnStyleLst>
+      <a:effectStyleLst>
+        <a:effectStyle>
+          <a:effectLst>
+            <a:outerShdw blurRad="40000" dist="20000" dir="5400000" rotWithShape="0">
+              <a:srgbClr val="000000">
+                <a:alpha val="38000"/>
+              </a:srgbClr>
+            </a:outerShdw>
+          </a:effectLst>
+        </a:effectStyle>
+        <a:effectStyle>
+          <a:effectLst>
+            <a:outerShdw blurRad="40000" dist="23000" dir="5400000" rotWithShape="0">
+              <a:srgbClr val="000000">
+                <a:alpha val="35000"/>
+              </a:srgbClr>
+            </a:outerShdw>
+          </a:effectLst>
+        </a:effectStyle>
+        <a:effectStyle>
+          <a:effectLst>
+            <a:outerShdw blurRad="40000" dist="23000" dir="5400000" rotWithShape="0">
+              <a:srgbClr val="000000">
+                <a:alpha val="35000"/>
+              </a:srgbClr>
+            </a:outerShdw>
+          </a:effectLst>
+          <a:scene3d>
+            <a:camera prst="orthographicFront">
+              <a:rot lat="0" lon="0" rev="0"/>
+            </a:camera>
+            <a:lightRig rig="threePt" dir="t">
+              <a:rot lat="0" lon="0" rev="1200000"/>
+            </a:lightRig>
+          </a:scene3d>
+          <a:sp3d>
+            <a:bevelT w="63500" h="25400"/>
+          </a:sp3d>
+        </a:effectStyle>
+      </a:effectStyleLst>
+      <a:bgFillStyleLst>
+        <a:solidFill>
+          <a:schemeClr val="phClr"/>
+        </a:solidFill>
+        <a:gradFill rotWithShape="1">
+          <a:gsLst>
+            <a:gs pos="0">
+              <a:schemeClr val="phClr">
+                <a:tint val="40000"/>
+                <a:satMod val="350000"/>
+              </a:schemeClr>
+            </a:gs>
+            <a:gs pos="40000">
+              <a:schemeClr val="phClr">
+                <a:tint val="45000"/>
+                <a:shade val="99000"/>
+                <a:satMod val="350000"/>
+              </a:schemeClr>
+            </a:gs>
+            <a:gs pos="100000">
+              <a:schemeClr val="phClr">
+                <a:shade val="20000"/>
+                <a:satMod val="255000"/>
+              </a:schemeClr>
+            </a:gs>
+          </a:gsLst>
+          <a:path path="circle">
+            <a:fillToRect l="50000" t="-80000" r="50000" b="180000"/>
+          </a:path>
+        </a:gradFill>
+        <a:gradFill rotWithShape="1">
+          <a:gsLst>
+            <a:gs pos="0">
+              <a:schemeClr val="phClr">
+                <a:tint val="80000"/>
+                <a:satMod val="300000"/>
+              </a:schemeClr>
+            </a:gs>
+            <a:gs pos="100000">
+              <a:schemeClr val="phClr">
+                <a:shade val="30000"/>
+                <a:satMod val="200000"/>
+              </a:schemeClr>
+            </a:gs>
+          </a:gsLst>
+          <a:path path="circle">
+            <a:fillToRect l="50000" t="50000" r="50000" b="50000"/>
+          </a:path>
+        </a:gradFill>
+      </a:bgFillStyleLst>
+    </a:fmtScheme>
+  </a:themeElements>
+  <a:objectDefaults/>
+  <a:extraClrSchemeLst/>
+</a:theme>
 </file>
</xml_diff>

<commit_message>
Ajuste nas telas de layouts
</commit_message>
<xml_diff>
--- a/Ppt.pptx
+++ b/Ppt.pptx
@@ -137,7 +137,7 @@
   </p:defaultTextStyle>
   <p:extLst>
     <p:ext uri="{EFAFB233-063F-42B5-8137-9DF3F51BA10A}">
-      <p15:sldGuideLst xmlns:p15="http://schemas.microsoft.com/office/powerpoint/2012/main">
+      <p15:sldGuideLst xmlns:p15="http://schemas.microsoft.com/office/powerpoint/2012/main" xmlns="">
         <p15:guide id="1" orient="horz" pos="2160">
           <p15:clr>
             <a:srgbClr val="A4A3A4"/>
@@ -9026,6 +9026,10 @@
         <a:bodyPr/>
         <a:lstStyle/>
         <a:p>
+          <a:r>
+            <a:rPr lang="pt-BR" dirty="0" smtClean="0"/>
+            <a:t>Configuração</a:t>
+          </a:r>
           <a:endParaRPr lang="pt-BR" dirty="0"/>
         </a:p>
       </dgm:t>
@@ -9098,7 +9102,7 @@
         <a:p>
           <a:r>
             <a:rPr lang="pt-BR" dirty="0" smtClean="0"/>
-            <a:t>Serviços</a:t>
+            <a:t>Webservices</a:t>
           </a:r>
           <a:endParaRPr lang="pt-BR" dirty="0"/>
         </a:p>
@@ -9135,7 +9139,7 @@
         <a:p>
           <a:r>
             <a:rPr lang="pt-BR" dirty="0" smtClean="0"/>
-            <a:t>Base terceiro</a:t>
+            <a:t>Bases terceiras</a:t>
           </a:r>
           <a:endParaRPr lang="pt-BR" dirty="0"/>
         </a:p>
@@ -9328,19 +9332,19 @@
     </dgm:pt>
   </dgm:ptLst>
   <dgm:cxnLst>
+    <dgm:cxn modelId="{70816197-3CCD-4374-A787-AD50B6C98107}" srcId="{41EDC0B5-5B2E-40F6-A795-26759C403F93}" destId="{3B8C848E-B7C5-4BFA-9530-8B78A658DBF9}" srcOrd="0" destOrd="0" parTransId="{63492834-D0E4-41B4-B7F7-53FCFD5E2B26}" sibTransId="{A1BBA8FF-D579-4E2A-8000-37E8226C6F13}"/>
+    <dgm:cxn modelId="{75D2E0ED-99D5-44BB-AB4D-0F23545695CF}" type="presOf" srcId="{41EDC0B5-5B2E-40F6-A795-26759C403F93}" destId="{5DC2A2A4-321E-49F3-87D9-1E402D63144A}" srcOrd="0" destOrd="0" presId="urn:microsoft.com/office/officeart/2005/8/layout/target2"/>
+    <dgm:cxn modelId="{C8C2BECC-9D45-4EA0-8AC7-5375EB5F3EB6}" srcId="{00AA778E-02C5-4AB7-94AA-A238D1ABCE99}" destId="{E050978C-0D9B-48B8-B177-C3932AA7913C}" srcOrd="0" destOrd="0" parTransId="{BB79AFD7-3839-453A-8EB2-A52F965A8C76}" sibTransId="{D22D7724-B8DF-454F-9C7C-F4D3FEA5F73C}"/>
+    <dgm:cxn modelId="{3005B341-3B26-4ADD-85E4-C5EDCE0C9E20}" type="presOf" srcId="{3522712F-F43A-4175-BE83-10EA01740169}" destId="{B75B4B1B-09EA-44A0-A091-652EBDE0EA98}" srcOrd="0" destOrd="0" presId="urn:microsoft.com/office/officeart/2005/8/layout/target2"/>
+    <dgm:cxn modelId="{972DCC70-CC7D-4C0D-B235-59E3598EF66A}" srcId="{3B8C848E-B7C5-4BFA-9530-8B78A658DBF9}" destId="{3522712F-F43A-4175-BE83-10EA01740169}" srcOrd="0" destOrd="0" parTransId="{9E1B4B29-EEF3-45C0-9878-1588634F9605}" sibTransId="{EC03DB40-A835-4E7C-BD1B-9A73530AE7D6}"/>
+    <dgm:cxn modelId="{50090F85-38F3-4F38-9C95-0E87B537E31A}" type="presOf" srcId="{27FA57F4-188E-4BD9-8285-85AC9430C1CA}" destId="{A5A6D88A-617E-417D-BD7B-EBF9A20413FC}" srcOrd="0" destOrd="0" presId="urn:microsoft.com/office/officeart/2005/8/layout/target2"/>
+    <dgm:cxn modelId="{FE52B234-DDA2-41A4-A0FB-8C00997A6DC9}" type="presOf" srcId="{A1B118FD-1FEB-4C32-90A6-C74FF73ACC39}" destId="{2C1EC8B9-85E5-46D8-A0E1-9621919A32B4}" srcOrd="0" destOrd="0" presId="urn:microsoft.com/office/officeart/2005/8/layout/target2"/>
+    <dgm:cxn modelId="{48FAC39E-92B9-4C02-B497-F47EA4BC281E}" type="presOf" srcId="{E050978C-0D9B-48B8-B177-C3932AA7913C}" destId="{003ADD9F-4AC4-45B5-8DD6-EC81A27549EB}" srcOrd="0" destOrd="0" presId="urn:microsoft.com/office/officeart/2005/8/layout/target2"/>
+    <dgm:cxn modelId="{83FF0B91-87EB-4F13-84AB-6C3D5FB7D2A5}" srcId="{41EDC0B5-5B2E-40F6-A795-26759C403F93}" destId="{27FA57F4-188E-4BD9-8285-85AC9430C1CA}" srcOrd="2" destOrd="0" parTransId="{EEDFEE3B-048B-4931-9733-606A3F23765B}" sibTransId="{8FFD755D-67E9-46A2-940B-D8AAEE3A428A}"/>
+    <dgm:cxn modelId="{3CCA7E8F-9E1A-48EA-BA14-0A763B20D42D}" srcId="{41EDC0B5-5B2E-40F6-A795-26759C403F93}" destId="{00AA778E-02C5-4AB7-94AA-A238D1ABCE99}" srcOrd="1" destOrd="0" parTransId="{29E54D22-60C7-46BE-9AFD-CA81944A36C4}" sibTransId="{7D102F0B-EB58-4562-BF14-F927D2AC4478}"/>
+    <dgm:cxn modelId="{852D2E0A-BBFF-4CF9-86C8-AA48801398EE}" type="presOf" srcId="{00AA778E-02C5-4AB7-94AA-A238D1ABCE99}" destId="{ADD3C99B-AFC3-47B1-A4DF-7A75CC6ABE97}" srcOrd="0" destOrd="0" presId="urn:microsoft.com/office/officeart/2005/8/layout/target2"/>
     <dgm:cxn modelId="{C54A608E-21D2-43AA-B51B-DEF0F85C137B}" srcId="{27FA57F4-188E-4BD9-8285-85AC9430C1CA}" destId="{A1B118FD-1FEB-4C32-90A6-C74FF73ACC39}" srcOrd="0" destOrd="0" parTransId="{5DB2BB6F-623C-4D2B-9BAF-DCD48CD1A9C5}" sibTransId="{8DA34FC6-56B2-4413-80C1-1BB77F092E34}"/>
-    <dgm:cxn modelId="{3CCA7E8F-9E1A-48EA-BA14-0A763B20D42D}" srcId="{41EDC0B5-5B2E-40F6-A795-26759C403F93}" destId="{00AA778E-02C5-4AB7-94AA-A238D1ABCE99}" srcOrd="1" destOrd="0" parTransId="{29E54D22-60C7-46BE-9AFD-CA81944A36C4}" sibTransId="{7D102F0B-EB58-4562-BF14-F927D2AC4478}"/>
-    <dgm:cxn modelId="{70816197-3CCD-4374-A787-AD50B6C98107}" srcId="{41EDC0B5-5B2E-40F6-A795-26759C403F93}" destId="{3B8C848E-B7C5-4BFA-9530-8B78A658DBF9}" srcOrd="0" destOrd="0" parTransId="{63492834-D0E4-41B4-B7F7-53FCFD5E2B26}" sibTransId="{A1BBA8FF-D579-4E2A-8000-37E8226C6F13}"/>
-    <dgm:cxn modelId="{83FF0B91-87EB-4F13-84AB-6C3D5FB7D2A5}" srcId="{41EDC0B5-5B2E-40F6-A795-26759C403F93}" destId="{27FA57F4-188E-4BD9-8285-85AC9430C1CA}" srcOrd="2" destOrd="0" parTransId="{EEDFEE3B-048B-4931-9733-606A3F23765B}" sibTransId="{8FFD755D-67E9-46A2-940B-D8AAEE3A428A}"/>
-    <dgm:cxn modelId="{972DCC70-CC7D-4C0D-B235-59E3598EF66A}" srcId="{3B8C848E-B7C5-4BFA-9530-8B78A658DBF9}" destId="{3522712F-F43A-4175-BE83-10EA01740169}" srcOrd="0" destOrd="0" parTransId="{9E1B4B29-EEF3-45C0-9878-1588634F9605}" sibTransId="{EC03DB40-A835-4E7C-BD1B-9A73530AE7D6}"/>
-    <dgm:cxn modelId="{FE52B234-DDA2-41A4-A0FB-8C00997A6DC9}" type="presOf" srcId="{A1B118FD-1FEB-4C32-90A6-C74FF73ACC39}" destId="{2C1EC8B9-85E5-46D8-A0E1-9621919A32B4}" srcOrd="0" destOrd="0" presId="urn:microsoft.com/office/officeart/2005/8/layout/target2"/>
-    <dgm:cxn modelId="{50090F85-38F3-4F38-9C95-0E87B537E31A}" type="presOf" srcId="{27FA57F4-188E-4BD9-8285-85AC9430C1CA}" destId="{A5A6D88A-617E-417D-BD7B-EBF9A20413FC}" srcOrd="0" destOrd="0" presId="urn:microsoft.com/office/officeart/2005/8/layout/target2"/>
-    <dgm:cxn modelId="{48FAC39E-92B9-4C02-B497-F47EA4BC281E}" type="presOf" srcId="{E050978C-0D9B-48B8-B177-C3932AA7913C}" destId="{003ADD9F-4AC4-45B5-8DD6-EC81A27549EB}" srcOrd="0" destOrd="0" presId="urn:microsoft.com/office/officeart/2005/8/layout/target2"/>
-    <dgm:cxn modelId="{852D2E0A-BBFF-4CF9-86C8-AA48801398EE}" type="presOf" srcId="{00AA778E-02C5-4AB7-94AA-A238D1ABCE99}" destId="{ADD3C99B-AFC3-47B1-A4DF-7A75CC6ABE97}" srcOrd="0" destOrd="0" presId="urn:microsoft.com/office/officeart/2005/8/layout/target2"/>
     <dgm:cxn modelId="{A64CD332-3C8D-4E29-BBA4-ACA4A5C70894}" type="presOf" srcId="{3B8C848E-B7C5-4BFA-9530-8B78A658DBF9}" destId="{BFCD2251-09FB-4193-82AE-20E41AABECB4}" srcOrd="0" destOrd="0" presId="urn:microsoft.com/office/officeart/2005/8/layout/target2"/>
-    <dgm:cxn modelId="{3005B341-3B26-4ADD-85E4-C5EDCE0C9E20}" type="presOf" srcId="{3522712F-F43A-4175-BE83-10EA01740169}" destId="{B75B4B1B-09EA-44A0-A091-652EBDE0EA98}" srcOrd="0" destOrd="0" presId="urn:microsoft.com/office/officeart/2005/8/layout/target2"/>
-    <dgm:cxn modelId="{C8C2BECC-9D45-4EA0-8AC7-5375EB5F3EB6}" srcId="{00AA778E-02C5-4AB7-94AA-A238D1ABCE99}" destId="{E050978C-0D9B-48B8-B177-C3932AA7913C}" srcOrd="0" destOrd="0" parTransId="{BB79AFD7-3839-453A-8EB2-A52F965A8C76}" sibTransId="{D22D7724-B8DF-454F-9C7C-F4D3FEA5F73C}"/>
-    <dgm:cxn modelId="{75D2E0ED-99D5-44BB-AB4D-0F23545695CF}" type="presOf" srcId="{41EDC0B5-5B2E-40F6-A795-26759C403F93}" destId="{5DC2A2A4-321E-49F3-87D9-1E402D63144A}" srcOrd="0" destOrd="0" presId="urn:microsoft.com/office/officeart/2005/8/layout/target2"/>
     <dgm:cxn modelId="{FBEA4A22-37AA-4D19-92F3-A05F7B4C4F3C}" type="presParOf" srcId="{5DC2A2A4-321E-49F3-87D9-1E402D63144A}" destId="{47ABF3AE-7C0F-4F37-99E7-26C498633561}" srcOrd="0" destOrd="0" presId="urn:microsoft.com/office/officeart/2005/8/layout/target2"/>
     <dgm:cxn modelId="{FBFC4953-E3A1-4666-AE1A-E9EA156A9741}" type="presParOf" srcId="{47ABF3AE-7C0F-4F37-99E7-26C498633561}" destId="{BFCD2251-09FB-4193-82AE-20E41AABECB4}" srcOrd="0" destOrd="0" presId="urn:microsoft.com/office/officeart/2005/8/layout/target2"/>
     <dgm:cxn modelId="{1C0CD012-4D6C-4F64-8494-29ED0B444B63}" type="presParOf" srcId="{47ABF3AE-7C0F-4F37-99E7-26C498633561}" destId="{40DC6C87-52FE-4881-A102-E1D5BF83157F}" srcOrd="1" destOrd="0" presId="urn:microsoft.com/office/officeart/2005/8/layout/target2"/>
@@ -13805,53 +13809,53 @@
     </dgm:pt>
   </dgm:ptLst>
   <dgm:cxnLst>
-    <dgm:cxn modelId="{AE1EFA4F-43D7-4B31-9E7F-940D6FCC10FD}" type="presOf" srcId="{7DF7B6DD-8D79-468E-B015-C667742FBFEB}" destId="{85F62DE2-963F-4C4E-96AF-E89F91C81D5C}" srcOrd="0" destOrd="0" presId="urn:microsoft.com/office/officeart/2008/layout/HorizontalMultiLevelHierarchy"/>
-    <dgm:cxn modelId="{B4FD77FA-C77B-48AF-8FBC-9D705ED00DE4}" type="presOf" srcId="{9B0E06C2-4430-4C22-92AF-6D91175F2E8B}" destId="{99E58E7E-BFE3-414B-AF9D-7BB998895FEF}" srcOrd="0" destOrd="0" presId="urn:microsoft.com/office/officeart/2008/layout/HorizontalMultiLevelHierarchy"/>
+    <dgm:cxn modelId="{18D20495-54B2-41BA-B806-37002FB53632}" type="presOf" srcId="{69705CEA-F570-453E-89C2-BF794F678958}" destId="{BC230F88-AF16-401E-847A-5EB6F35167B5}" srcOrd="0" destOrd="0" presId="urn:microsoft.com/office/officeart/2008/layout/HorizontalMultiLevelHierarchy"/>
+    <dgm:cxn modelId="{E47C819D-D54E-4599-897F-5F05D785E91C}" type="presOf" srcId="{80A8E8CD-E500-4265-9EBD-08F5903454F8}" destId="{4E7B5B8A-E25E-4056-A287-F1501FE9A818}" srcOrd="1" destOrd="0" presId="urn:microsoft.com/office/officeart/2008/layout/HorizontalMultiLevelHierarchy"/>
+    <dgm:cxn modelId="{C91CC287-7190-42C4-97C0-2D91E272BCC3}" type="presOf" srcId="{47DBA1AE-1E15-431B-816E-E3495D91D50D}" destId="{C3B714E9-8D56-4F47-AE83-1B4A1B36E261}" srcOrd="0" destOrd="0" presId="urn:microsoft.com/office/officeart/2008/layout/HorizontalMultiLevelHierarchy"/>
+    <dgm:cxn modelId="{020A2310-5D97-4D7E-9909-51E2CE9FB027}" type="presOf" srcId="{7D4A7BEA-0826-4D7F-9B13-830276B86077}" destId="{175FB72B-84C8-486C-9686-3AA16043A190}" srcOrd="0" destOrd="0" presId="urn:microsoft.com/office/officeart/2008/layout/HorizontalMultiLevelHierarchy"/>
+    <dgm:cxn modelId="{68BEAA0F-F727-404F-A1C3-B6A93BF7DE79}" type="presOf" srcId="{B3A3E97E-B1F5-4285-B3CC-626A9AFB88AF}" destId="{962A20E9-4E8A-4469-B9A9-712648A37A7E}" srcOrd="1" destOrd="0" presId="urn:microsoft.com/office/officeart/2008/layout/HorizontalMultiLevelHierarchy"/>
+    <dgm:cxn modelId="{DC17CFEB-C2B6-4EF4-A568-2436AA4299E9}" type="presOf" srcId="{BCECA982-1209-40D3-90B9-DB39233875A5}" destId="{85116997-987D-40A8-AFCA-C5A54CBB823D}" srcOrd="0" destOrd="0" presId="urn:microsoft.com/office/officeart/2008/layout/HorizontalMultiLevelHierarchy"/>
+    <dgm:cxn modelId="{0E9DAE43-BD16-4A14-9821-2524BC241F48}" srcId="{CE13128E-9149-4B70-91DE-630C4ABBFE00}" destId="{08C55BA2-31D6-43CA-BE8B-18095A33123C}" srcOrd="1" destOrd="0" parTransId="{6DB745CF-1A78-406B-8408-ECE8759E9FA1}" sibTransId="{E3EE3127-9860-436D-80DB-2AE4EBD12F9F}"/>
+    <dgm:cxn modelId="{A67FD952-7E3E-42C2-B9AC-9786F65D1584}" srcId="{08C55BA2-31D6-43CA-BE8B-18095A33123C}" destId="{4A1CE773-3E85-4B37-BA18-CB28DF37705F}" srcOrd="0" destOrd="0" parTransId="{C970C188-F04F-415C-B685-2C4E7AFB148E}" sibTransId="{1EF5A848-6056-46B2-8C3B-F197EDA52614}"/>
+    <dgm:cxn modelId="{A9952C7E-C879-479B-834A-6036B1AB1527}" srcId="{7DF7B6DD-8D79-468E-B015-C667742FBFEB}" destId="{CE13128E-9149-4B70-91DE-630C4ABBFE00}" srcOrd="0" destOrd="0" parTransId="{C6E5B58F-10F1-4A0F-B24B-83ABFC7283E8}" sibTransId="{6CE5C753-8F6C-4D7B-8CBB-35D97C591B3B}"/>
+    <dgm:cxn modelId="{D5162A70-9646-4B9A-9D47-8847B119A36D}" type="presOf" srcId="{DC5DA3D9-0E16-42DE-894D-7A0ACA3BEA89}" destId="{5AE26B0C-D01B-45E0-A33F-6264A326BBFD}" srcOrd="1" destOrd="0" presId="urn:microsoft.com/office/officeart/2008/layout/HorizontalMultiLevelHierarchy"/>
+    <dgm:cxn modelId="{BB8CC356-122F-4E4D-BF7E-874EEDB47A04}" type="presOf" srcId="{C6E5B58F-10F1-4A0F-B24B-83ABFC7283E8}" destId="{E04E75EF-3FF5-4F99-9454-4458B90560B9}" srcOrd="0" destOrd="0" presId="urn:microsoft.com/office/officeart/2008/layout/HorizontalMultiLevelHierarchy"/>
+    <dgm:cxn modelId="{B353EAEA-C1EF-497E-AD8A-EEFA8A1765D1}" type="presOf" srcId="{305D8F76-DE5C-477C-9DE0-661AB94732FF}" destId="{2DB62359-910D-4F81-A286-8DE2D01AD00D}" srcOrd="1" destOrd="0" presId="urn:microsoft.com/office/officeart/2008/layout/HorizontalMultiLevelHierarchy"/>
+    <dgm:cxn modelId="{BB366179-8CB8-48F8-B469-8D59183C75FA}" type="presOf" srcId="{DC5DA3D9-0E16-42DE-894D-7A0ACA3BEA89}" destId="{76804D07-263C-4BFE-886B-E38C63B4A639}" srcOrd="0" destOrd="0" presId="urn:microsoft.com/office/officeart/2008/layout/HorizontalMultiLevelHierarchy"/>
+    <dgm:cxn modelId="{CC33FE3A-2675-4C05-AC2C-C262B46663BD}" type="presOf" srcId="{08C55BA2-31D6-43CA-BE8B-18095A33123C}" destId="{E44A7F6B-CDD6-46D7-8C6D-31E128DCFA9B}" srcOrd="0" destOrd="0" presId="urn:microsoft.com/office/officeart/2008/layout/HorizontalMultiLevelHierarchy"/>
+    <dgm:cxn modelId="{8F03D61F-9583-4BD6-9C0A-EAE164CEDD1E}" srcId="{D24B9365-C298-4D09-9B43-19F1F42CB936}" destId="{9CDE7211-7213-4221-9E18-349FFE24B791}" srcOrd="0" destOrd="0" parTransId="{DC5DA3D9-0E16-42DE-894D-7A0ACA3BEA89}" sibTransId="{29A5C94B-43C5-43DC-83C7-D6A9D3B54949}"/>
+    <dgm:cxn modelId="{4A871634-BAF2-4366-8270-342BEC8E9356}" type="presOf" srcId="{BCECA982-1209-40D3-90B9-DB39233875A5}" destId="{59995DB5-1B81-4758-85FC-551EB375F06C}" srcOrd="1" destOrd="0" presId="urn:microsoft.com/office/officeart/2008/layout/HorizontalMultiLevelHierarchy"/>
+    <dgm:cxn modelId="{1BF0094A-FEFC-422B-B205-AFF45445190D}" type="presOf" srcId="{63FF3E21-F438-42A5-8D7B-E965B1D3812A}" destId="{9539C340-DD91-4CCB-9617-C26D5EA57291}" srcOrd="1" destOrd="0" presId="urn:microsoft.com/office/officeart/2008/layout/HorizontalMultiLevelHierarchy"/>
+    <dgm:cxn modelId="{8E4EFBD5-37F1-443C-8D37-89A4DC4A200B}" type="presOf" srcId="{31A7FA4E-1377-4668-AA4A-F847E0BA75F9}" destId="{64DC2729-4AEE-46FC-A4B3-43AAC41F9DD2}" srcOrd="0" destOrd="0" presId="urn:microsoft.com/office/officeart/2008/layout/HorizontalMultiLevelHierarchy"/>
+    <dgm:cxn modelId="{27FA3CE5-0EFE-4E17-AEF1-7436EA42B042}" srcId="{4A1CE773-3E85-4B37-BA18-CB28DF37705F}" destId="{47DBA1AE-1E15-431B-816E-E3495D91D50D}" srcOrd="0" destOrd="0" parTransId="{DB96E258-2D1C-4B1E-950D-055EBF0AF5CA}" sibTransId="{91669A65-5834-4388-8EB8-E7B6090E317E}"/>
     <dgm:cxn modelId="{AE4F2E6D-309B-4F80-8E06-C12019005D59}" type="presOf" srcId="{DB96E258-2D1C-4B1E-950D-055EBF0AF5CA}" destId="{1B00757B-AD37-414D-BCDF-A22538F398D1}" srcOrd="1" destOrd="0" presId="urn:microsoft.com/office/officeart/2008/layout/HorizontalMultiLevelHierarchy"/>
+    <dgm:cxn modelId="{F693BDB5-3E8E-4D97-A21C-531C30DC49A7}" type="presOf" srcId="{C00D11A3-9D06-466C-BA99-53F0B6A1B1FC}" destId="{2FAEB9D7-2202-48D6-BEFE-7691405C0023}" srcOrd="0" destOrd="0" presId="urn:microsoft.com/office/officeart/2008/layout/HorizontalMultiLevelHierarchy"/>
+    <dgm:cxn modelId="{B54418A1-3FDE-464D-B17A-A04C569FE824}" type="presOf" srcId="{6DB745CF-1A78-406B-8408-ECE8759E9FA1}" destId="{3E2CFF2C-518D-45AB-95AC-8B2259762694}" srcOrd="1" destOrd="0" presId="urn:microsoft.com/office/officeart/2008/layout/HorizontalMultiLevelHierarchy"/>
+    <dgm:cxn modelId="{82597DAD-63A8-4A76-B9BE-23D8DF04E26F}" type="presOf" srcId="{CE13128E-9149-4B70-91DE-630C4ABBFE00}" destId="{CCC824B9-6D4D-4981-9C76-2E02AF6A080B}" srcOrd="0" destOrd="0" presId="urn:microsoft.com/office/officeart/2008/layout/HorizontalMultiLevelHierarchy"/>
+    <dgm:cxn modelId="{EA349AEE-F38C-4392-A380-76DF0CF9C396}" type="presOf" srcId="{C970C188-F04F-415C-B685-2C4E7AFB148E}" destId="{D9A7ED5D-FF3B-42E9-A95A-82691CE48DCF}" srcOrd="0" destOrd="0" presId="urn:microsoft.com/office/officeart/2008/layout/HorizontalMultiLevelHierarchy"/>
     <dgm:cxn modelId="{9F3DCA4B-DDEA-4D57-A2BE-01EDAA20879E}" srcId="{3D7E4721-08AD-4056-9D97-280A0288FF53}" destId="{7DF7B6DD-8D79-468E-B015-C667742FBFEB}" srcOrd="0" destOrd="0" parTransId="{1B8AF3C6-2F66-4552-8F48-4A75818AB395}" sibTransId="{473ED60A-3384-44E1-AF12-F229B86CAE9E}"/>
     <dgm:cxn modelId="{0911AA29-B75D-4350-AE96-7B3FAD2DFDF5}" type="presOf" srcId="{C00D11A3-9D06-466C-BA99-53F0B6A1B1FC}" destId="{4A7E1716-0151-45F0-9631-89C21FC2D372}" srcOrd="1" destOrd="0" presId="urn:microsoft.com/office/officeart/2008/layout/HorizontalMultiLevelHierarchy"/>
+    <dgm:cxn modelId="{91BB3751-AE35-42E3-9C14-D0C99A4298F0}" srcId="{69705CEA-F570-453E-89C2-BF794F678958}" destId="{7D4A7BEA-0826-4D7F-9B13-830276B86077}" srcOrd="0" destOrd="0" parTransId="{80A8E8CD-E500-4265-9EBD-08F5903454F8}" sibTransId="{652FD5D0-86D7-4337-9B75-D2CD6C870809}"/>
+    <dgm:cxn modelId="{84BE7329-BE44-40EF-A84C-01DCF7EA027F}" type="presOf" srcId="{0ED25E3A-194B-4DBD-AE05-C5BAB2D4B322}" destId="{FBCAE61C-F8F7-4954-B5B0-98F173752588}" srcOrd="0" destOrd="0" presId="urn:microsoft.com/office/officeart/2008/layout/HorizontalMultiLevelHierarchy"/>
+    <dgm:cxn modelId="{CC6C77C6-FE6E-49D4-86B7-B41D722DE6FD}" srcId="{D24B9365-C298-4D09-9B43-19F1F42CB936}" destId="{31A7FA4E-1377-4668-AA4A-F847E0BA75F9}" srcOrd="1" destOrd="0" parTransId="{BCECA982-1209-40D3-90B9-DB39233875A5}" sibTransId="{84D3DBC8-A14D-46AC-9625-01BC5680C226}"/>
+    <dgm:cxn modelId="{39F6116F-B56E-4177-8F3B-03B043793E50}" type="presOf" srcId="{DB96E258-2D1C-4B1E-950D-055EBF0AF5CA}" destId="{C0070F97-A64B-4B18-A039-4EA6BBCC45E3}" srcOrd="0" destOrd="0" presId="urn:microsoft.com/office/officeart/2008/layout/HorizontalMultiLevelHierarchy"/>
+    <dgm:cxn modelId="{AE1EFA4F-43D7-4B31-9E7F-940D6FCC10FD}" type="presOf" srcId="{7DF7B6DD-8D79-468E-B015-C667742FBFEB}" destId="{85F62DE2-963F-4C4E-96AF-E89F91C81D5C}" srcOrd="0" destOrd="0" presId="urn:microsoft.com/office/officeart/2008/layout/HorizontalMultiLevelHierarchy"/>
     <dgm:cxn modelId="{6C19DA65-7600-49E5-A4BA-A0BBEFEC9683}" type="presOf" srcId="{6DB745CF-1A78-406B-8408-ECE8759E9FA1}" destId="{7FF2BF7D-A4BE-4AF2-9EFD-0878EA33F434}" srcOrd="0" destOrd="0" presId="urn:microsoft.com/office/officeart/2008/layout/HorizontalMultiLevelHierarchy"/>
-    <dgm:cxn modelId="{DC17CFEB-C2B6-4EF4-A568-2436AA4299E9}" type="presOf" srcId="{BCECA982-1209-40D3-90B9-DB39233875A5}" destId="{85116997-987D-40A8-AFCA-C5A54CBB823D}" srcOrd="0" destOrd="0" presId="urn:microsoft.com/office/officeart/2008/layout/HorizontalMultiLevelHierarchy"/>
-    <dgm:cxn modelId="{E47C819D-D54E-4599-897F-5F05D785E91C}" type="presOf" srcId="{80A8E8CD-E500-4265-9EBD-08F5903454F8}" destId="{4E7B5B8A-E25E-4056-A287-F1501FE9A818}" srcOrd="1" destOrd="0" presId="urn:microsoft.com/office/officeart/2008/layout/HorizontalMultiLevelHierarchy"/>
-    <dgm:cxn modelId="{84BE7329-BE44-40EF-A84C-01DCF7EA027F}" type="presOf" srcId="{0ED25E3A-194B-4DBD-AE05-C5BAB2D4B322}" destId="{FBCAE61C-F8F7-4954-B5B0-98F173752588}" srcOrd="0" destOrd="0" presId="urn:microsoft.com/office/officeart/2008/layout/HorizontalMultiLevelHierarchy"/>
-    <dgm:cxn modelId="{4A871634-BAF2-4366-8270-342BEC8E9356}" type="presOf" srcId="{BCECA982-1209-40D3-90B9-DB39233875A5}" destId="{59995DB5-1B81-4758-85FC-551EB375F06C}" srcOrd="1" destOrd="0" presId="urn:microsoft.com/office/officeart/2008/layout/HorizontalMultiLevelHierarchy"/>
-    <dgm:cxn modelId="{EA349AEE-F38C-4392-A380-76DF0CF9C396}" type="presOf" srcId="{C970C188-F04F-415C-B685-2C4E7AFB148E}" destId="{D9A7ED5D-FF3B-42E9-A95A-82691CE48DCF}" srcOrd="0" destOrd="0" presId="urn:microsoft.com/office/officeart/2008/layout/HorizontalMultiLevelHierarchy"/>
-    <dgm:cxn modelId="{27FA3CE5-0EFE-4E17-AEF1-7436EA42B042}" srcId="{4A1CE773-3E85-4B37-BA18-CB28DF37705F}" destId="{47DBA1AE-1E15-431B-816E-E3495D91D50D}" srcOrd="0" destOrd="0" parTransId="{DB96E258-2D1C-4B1E-950D-055EBF0AF5CA}" sibTransId="{91669A65-5834-4388-8EB8-E7B6090E317E}"/>
     <dgm:cxn modelId="{B671D779-080D-46B7-806E-9D6D7A129DE5}" type="presOf" srcId="{B3A3E97E-B1F5-4285-B3CC-626A9AFB88AF}" destId="{7F8C45BB-9C92-4B8F-B244-3A92D6C34FF5}" srcOrd="0" destOrd="0" presId="urn:microsoft.com/office/officeart/2008/layout/HorizontalMultiLevelHierarchy"/>
-    <dgm:cxn modelId="{BB8CC356-122F-4E4D-BF7E-874EEDB47A04}" type="presOf" srcId="{C6E5B58F-10F1-4A0F-B24B-83ABFC7283E8}" destId="{E04E75EF-3FF5-4F99-9454-4458B90560B9}" srcOrd="0" destOrd="0" presId="urn:microsoft.com/office/officeart/2008/layout/HorizontalMultiLevelHierarchy"/>
-    <dgm:cxn modelId="{BB366179-8CB8-48F8-B469-8D59183C75FA}" type="presOf" srcId="{DC5DA3D9-0E16-42DE-894D-7A0ACA3BEA89}" destId="{76804D07-263C-4BFE-886B-E38C63B4A639}" srcOrd="0" destOrd="0" presId="urn:microsoft.com/office/officeart/2008/layout/HorizontalMultiLevelHierarchy"/>
-    <dgm:cxn modelId="{A9952C7E-C879-479B-834A-6036B1AB1527}" srcId="{7DF7B6DD-8D79-468E-B015-C667742FBFEB}" destId="{CE13128E-9149-4B70-91DE-630C4ABBFE00}" srcOrd="0" destOrd="0" parTransId="{C6E5B58F-10F1-4A0F-B24B-83ABFC7283E8}" sibTransId="{6CE5C753-8F6C-4D7B-8CBB-35D97C591B3B}"/>
-    <dgm:cxn modelId="{82597DAD-63A8-4A76-B9BE-23D8DF04E26F}" type="presOf" srcId="{CE13128E-9149-4B70-91DE-630C4ABBFE00}" destId="{CCC824B9-6D4D-4981-9C76-2E02AF6A080B}" srcOrd="0" destOrd="0" presId="urn:microsoft.com/office/officeart/2008/layout/HorizontalMultiLevelHierarchy"/>
-    <dgm:cxn modelId="{B54418A1-3FDE-464D-B17A-A04C569FE824}" type="presOf" srcId="{6DB745CF-1A78-406B-8408-ECE8759E9FA1}" destId="{3E2CFF2C-518D-45AB-95AC-8B2259762694}" srcOrd="1" destOrd="0" presId="urn:microsoft.com/office/officeart/2008/layout/HorizontalMultiLevelHierarchy"/>
-    <dgm:cxn modelId="{F693BDB5-3E8E-4D97-A21C-531C30DC49A7}" type="presOf" srcId="{C00D11A3-9D06-466C-BA99-53F0B6A1B1FC}" destId="{2FAEB9D7-2202-48D6-BEFE-7691405C0023}" srcOrd="0" destOrd="0" presId="urn:microsoft.com/office/officeart/2008/layout/HorizontalMultiLevelHierarchy"/>
-    <dgm:cxn modelId="{8F03D61F-9583-4BD6-9C0A-EAE164CEDD1E}" srcId="{D24B9365-C298-4D09-9B43-19F1F42CB936}" destId="{9CDE7211-7213-4221-9E18-349FFE24B791}" srcOrd="0" destOrd="0" parTransId="{DC5DA3D9-0E16-42DE-894D-7A0ACA3BEA89}" sibTransId="{29A5C94B-43C5-43DC-83C7-D6A9D3B54949}"/>
+    <dgm:cxn modelId="{788DF614-934B-4CDE-8FF1-17B10ABAAFDA}" type="presOf" srcId="{C970C188-F04F-415C-B685-2C4E7AFB148E}" destId="{C592C0A8-EC42-4A45-91EE-9CDFDF8DA551}" srcOrd="1" destOrd="0" presId="urn:microsoft.com/office/officeart/2008/layout/HorizontalMultiLevelHierarchy"/>
+    <dgm:cxn modelId="{1A56D051-FCD1-4ACE-B517-CA53D4CD293A}" type="presOf" srcId="{C6E5B58F-10F1-4A0F-B24B-83ABFC7283E8}" destId="{350094D2-7DCD-4D6D-BF3C-22BADCB8186A}" srcOrd="1" destOrd="0" presId="urn:microsoft.com/office/officeart/2008/layout/HorizontalMultiLevelHierarchy"/>
+    <dgm:cxn modelId="{9A780A0D-89E7-413B-80CA-0ADF2A767F6C}" type="presOf" srcId="{D24B9365-C298-4D09-9B43-19F1F42CB936}" destId="{C1F3184D-BED2-4588-91D0-6026066D0495}" srcOrd="0" destOrd="0" presId="urn:microsoft.com/office/officeart/2008/layout/HorizontalMultiLevelHierarchy"/>
+    <dgm:cxn modelId="{38540718-F67F-4C11-9B24-F182E409F9F7}" srcId="{4A1CE773-3E85-4B37-BA18-CB28DF37705F}" destId="{9B0E06C2-4430-4C22-92AF-6D91175F2E8B}" srcOrd="1" destOrd="0" parTransId="{B3A3E97E-B1F5-4285-B3CC-626A9AFB88AF}" sibTransId="{7EF15AAC-523E-46E8-BCE2-0064739EBD0B}"/>
     <dgm:cxn modelId="{FBC35013-D260-4A4E-A0AB-B35E1343F84D}" srcId="{7D4A7BEA-0826-4D7F-9B13-830276B86077}" destId="{D24B9365-C298-4D09-9B43-19F1F42CB936}" srcOrd="0" destOrd="0" parTransId="{63FF3E21-F438-42A5-8D7B-E965B1D3812A}" sibTransId="{8DD4E92C-112D-485C-B591-98B1A3C4F30E}"/>
-    <dgm:cxn modelId="{020A2310-5D97-4D7E-9909-51E2CE9FB027}" type="presOf" srcId="{7D4A7BEA-0826-4D7F-9B13-830276B86077}" destId="{175FB72B-84C8-486C-9686-3AA16043A190}" srcOrd="0" destOrd="0" presId="urn:microsoft.com/office/officeart/2008/layout/HorizontalMultiLevelHierarchy"/>
-    <dgm:cxn modelId="{100C4F7D-2A1A-4546-B2DC-F10C4BB3C755}" srcId="{7DF7B6DD-8D79-468E-B015-C667742FBFEB}" destId="{69705CEA-F570-453E-89C2-BF794F678958}" srcOrd="1" destOrd="0" parTransId="{C00D11A3-9D06-466C-BA99-53F0B6A1B1FC}" sibTransId="{2CA70043-153C-4528-8CBA-351914359EE1}"/>
-    <dgm:cxn modelId="{788DF614-934B-4CDE-8FF1-17B10ABAAFDA}" type="presOf" srcId="{C970C188-F04F-415C-B685-2C4E7AFB148E}" destId="{C592C0A8-EC42-4A45-91EE-9CDFDF8DA551}" srcOrd="1" destOrd="0" presId="urn:microsoft.com/office/officeart/2008/layout/HorizontalMultiLevelHierarchy"/>
-    <dgm:cxn modelId="{E7A7BC4A-FA59-4FC2-A70C-7826F6D84463}" type="presOf" srcId="{3D7E4721-08AD-4056-9D97-280A0288FF53}" destId="{48EA20E2-9F73-4378-9103-C6F25598EA7F}" srcOrd="0" destOrd="0" presId="urn:microsoft.com/office/officeart/2008/layout/HorizontalMultiLevelHierarchy"/>
-    <dgm:cxn modelId="{C91CC287-7190-42C4-97C0-2D91E272BCC3}" type="presOf" srcId="{47DBA1AE-1E15-431B-816E-E3495D91D50D}" destId="{C3B714E9-8D56-4F47-AE83-1B4A1B36E261}" srcOrd="0" destOrd="0" presId="urn:microsoft.com/office/officeart/2008/layout/HorizontalMultiLevelHierarchy"/>
-    <dgm:cxn modelId="{A9BC8CC8-D9B4-420C-A71C-562C76E994F1}" srcId="{CE13128E-9149-4B70-91DE-630C4ABBFE00}" destId="{0ED25E3A-194B-4DBD-AE05-C5BAB2D4B322}" srcOrd="0" destOrd="0" parTransId="{305D8F76-DE5C-477C-9DE0-661AB94732FF}" sibTransId="{964FDF4F-7DC1-44AC-84EA-F8B8AA5B99EA}"/>
-    <dgm:cxn modelId="{9A780A0D-89E7-413B-80CA-0ADF2A767F6C}" type="presOf" srcId="{D24B9365-C298-4D09-9B43-19F1F42CB936}" destId="{C1F3184D-BED2-4588-91D0-6026066D0495}" srcOrd="0" destOrd="0" presId="urn:microsoft.com/office/officeart/2008/layout/HorizontalMultiLevelHierarchy"/>
-    <dgm:cxn modelId="{39F6116F-B56E-4177-8F3B-03B043793E50}" type="presOf" srcId="{DB96E258-2D1C-4B1E-950D-055EBF0AF5CA}" destId="{C0070F97-A64B-4B18-A039-4EA6BBCC45E3}" srcOrd="0" destOrd="0" presId="urn:microsoft.com/office/officeart/2008/layout/HorizontalMultiLevelHierarchy"/>
     <dgm:cxn modelId="{D4921EC2-E1FF-4937-9022-063F086BEBF0}" type="presOf" srcId="{305D8F76-DE5C-477C-9DE0-661AB94732FF}" destId="{040CB96B-06C3-4570-9EDB-C32DFC727847}" srcOrd="0" destOrd="0" presId="urn:microsoft.com/office/officeart/2008/layout/HorizontalMultiLevelHierarchy"/>
     <dgm:cxn modelId="{B3194426-8F2C-4599-8334-A77C24E85D70}" type="presOf" srcId="{63FF3E21-F438-42A5-8D7B-E965B1D3812A}" destId="{11F12F7E-0B93-41A3-87BC-24FCC6E0289B}" srcOrd="0" destOrd="0" presId="urn:microsoft.com/office/officeart/2008/layout/HorizontalMultiLevelHierarchy"/>
-    <dgm:cxn modelId="{8E4EFBD5-37F1-443C-8D37-89A4DC4A200B}" type="presOf" srcId="{31A7FA4E-1377-4668-AA4A-F847E0BA75F9}" destId="{64DC2729-4AEE-46FC-A4B3-43AAC41F9DD2}" srcOrd="0" destOrd="0" presId="urn:microsoft.com/office/officeart/2008/layout/HorizontalMultiLevelHierarchy"/>
-    <dgm:cxn modelId="{D5162A70-9646-4B9A-9D47-8847B119A36D}" type="presOf" srcId="{DC5DA3D9-0E16-42DE-894D-7A0ACA3BEA89}" destId="{5AE26B0C-D01B-45E0-A33F-6264A326BBFD}" srcOrd="1" destOrd="0" presId="urn:microsoft.com/office/officeart/2008/layout/HorizontalMultiLevelHierarchy"/>
+    <dgm:cxn modelId="{100C4F7D-2A1A-4546-B2DC-F10C4BB3C755}" srcId="{7DF7B6DD-8D79-468E-B015-C667742FBFEB}" destId="{69705CEA-F570-453E-89C2-BF794F678958}" srcOrd="1" destOrd="0" parTransId="{C00D11A3-9D06-466C-BA99-53F0B6A1B1FC}" sibTransId="{2CA70043-153C-4528-8CBA-351914359EE1}"/>
+    <dgm:cxn modelId="{A9BC8CC8-D9B4-420C-A71C-562C76E994F1}" srcId="{CE13128E-9149-4B70-91DE-630C4ABBFE00}" destId="{0ED25E3A-194B-4DBD-AE05-C5BAB2D4B322}" srcOrd="0" destOrd="0" parTransId="{305D8F76-DE5C-477C-9DE0-661AB94732FF}" sibTransId="{964FDF4F-7DC1-44AC-84EA-F8B8AA5B99EA}"/>
     <dgm:cxn modelId="{C1B85BF8-8C75-4508-BDA6-ED7D32829F8E}" type="presOf" srcId="{9CDE7211-7213-4221-9E18-349FFE24B791}" destId="{9D43B9EB-EF57-4CA9-8875-07E50AC536FE}" srcOrd="0" destOrd="0" presId="urn:microsoft.com/office/officeart/2008/layout/HorizontalMultiLevelHierarchy"/>
-    <dgm:cxn modelId="{38540718-F67F-4C11-9B24-F182E409F9F7}" srcId="{4A1CE773-3E85-4B37-BA18-CB28DF37705F}" destId="{9B0E06C2-4430-4C22-92AF-6D91175F2E8B}" srcOrd="1" destOrd="0" parTransId="{B3A3E97E-B1F5-4285-B3CC-626A9AFB88AF}" sibTransId="{7EF15AAC-523E-46E8-BCE2-0064739EBD0B}"/>
+    <dgm:cxn modelId="{D6CC8C56-3DAD-4CE5-BB65-51B263CD22D9}" type="presOf" srcId="{80A8E8CD-E500-4265-9EBD-08F5903454F8}" destId="{A8088930-A153-477E-9029-C095C3D50AF4}" srcOrd="0" destOrd="0" presId="urn:microsoft.com/office/officeart/2008/layout/HorizontalMultiLevelHierarchy"/>
+    <dgm:cxn modelId="{E7A7BC4A-FA59-4FC2-A70C-7826F6D84463}" type="presOf" srcId="{3D7E4721-08AD-4056-9D97-280A0288FF53}" destId="{48EA20E2-9F73-4378-9103-C6F25598EA7F}" srcOrd="0" destOrd="0" presId="urn:microsoft.com/office/officeart/2008/layout/HorizontalMultiLevelHierarchy"/>
+    <dgm:cxn modelId="{B4FD77FA-C77B-48AF-8FBC-9D705ED00DE4}" type="presOf" srcId="{9B0E06C2-4430-4C22-92AF-6D91175F2E8B}" destId="{99E58E7E-BFE3-414B-AF9D-7BB998895FEF}" srcOrd="0" destOrd="0" presId="urn:microsoft.com/office/officeart/2008/layout/HorizontalMultiLevelHierarchy"/>
     <dgm:cxn modelId="{E8E957DC-8B5E-4F8C-B5ED-96F2A805E2A8}" type="presOf" srcId="{4A1CE773-3E85-4B37-BA18-CB28DF37705F}" destId="{08C3CC76-66C0-40DD-B207-18615301AEA6}" srcOrd="0" destOrd="0" presId="urn:microsoft.com/office/officeart/2008/layout/HorizontalMultiLevelHierarchy"/>
-    <dgm:cxn modelId="{91BB3751-AE35-42E3-9C14-D0C99A4298F0}" srcId="{69705CEA-F570-453E-89C2-BF794F678958}" destId="{7D4A7BEA-0826-4D7F-9B13-830276B86077}" srcOrd="0" destOrd="0" parTransId="{80A8E8CD-E500-4265-9EBD-08F5903454F8}" sibTransId="{652FD5D0-86D7-4337-9B75-D2CD6C870809}"/>
-    <dgm:cxn modelId="{18D20495-54B2-41BA-B806-37002FB53632}" type="presOf" srcId="{69705CEA-F570-453E-89C2-BF794F678958}" destId="{BC230F88-AF16-401E-847A-5EB6F35167B5}" srcOrd="0" destOrd="0" presId="urn:microsoft.com/office/officeart/2008/layout/HorizontalMultiLevelHierarchy"/>
-    <dgm:cxn modelId="{1A56D051-FCD1-4ACE-B517-CA53D4CD293A}" type="presOf" srcId="{C6E5B58F-10F1-4A0F-B24B-83ABFC7283E8}" destId="{350094D2-7DCD-4D6D-BF3C-22BADCB8186A}" srcOrd="1" destOrd="0" presId="urn:microsoft.com/office/officeart/2008/layout/HorizontalMultiLevelHierarchy"/>
-    <dgm:cxn modelId="{D6CC8C56-3DAD-4CE5-BB65-51B263CD22D9}" type="presOf" srcId="{80A8E8CD-E500-4265-9EBD-08F5903454F8}" destId="{A8088930-A153-477E-9029-C095C3D50AF4}" srcOrd="0" destOrd="0" presId="urn:microsoft.com/office/officeart/2008/layout/HorizontalMultiLevelHierarchy"/>
-    <dgm:cxn modelId="{CC33FE3A-2675-4C05-AC2C-C262B46663BD}" type="presOf" srcId="{08C55BA2-31D6-43CA-BE8B-18095A33123C}" destId="{E44A7F6B-CDD6-46D7-8C6D-31E128DCFA9B}" srcOrd="0" destOrd="0" presId="urn:microsoft.com/office/officeart/2008/layout/HorizontalMultiLevelHierarchy"/>
-    <dgm:cxn modelId="{A67FD952-7E3E-42C2-B9AC-9786F65D1584}" srcId="{08C55BA2-31D6-43CA-BE8B-18095A33123C}" destId="{4A1CE773-3E85-4B37-BA18-CB28DF37705F}" srcOrd="0" destOrd="0" parTransId="{C970C188-F04F-415C-B685-2C4E7AFB148E}" sibTransId="{1EF5A848-6056-46B2-8C3B-F197EDA52614}"/>
-    <dgm:cxn modelId="{CC6C77C6-FE6E-49D4-86B7-B41D722DE6FD}" srcId="{D24B9365-C298-4D09-9B43-19F1F42CB936}" destId="{31A7FA4E-1377-4668-AA4A-F847E0BA75F9}" srcOrd="1" destOrd="0" parTransId="{BCECA982-1209-40D3-90B9-DB39233875A5}" sibTransId="{84D3DBC8-A14D-46AC-9625-01BC5680C226}"/>
-    <dgm:cxn modelId="{1BF0094A-FEFC-422B-B205-AFF45445190D}" type="presOf" srcId="{63FF3E21-F438-42A5-8D7B-E965B1D3812A}" destId="{9539C340-DD91-4CCB-9617-C26D5EA57291}" srcOrd="1" destOrd="0" presId="urn:microsoft.com/office/officeart/2008/layout/HorizontalMultiLevelHierarchy"/>
-    <dgm:cxn modelId="{68BEAA0F-F727-404F-A1C3-B6A93BF7DE79}" type="presOf" srcId="{B3A3E97E-B1F5-4285-B3CC-626A9AFB88AF}" destId="{962A20E9-4E8A-4469-B9A9-712648A37A7E}" srcOrd="1" destOrd="0" presId="urn:microsoft.com/office/officeart/2008/layout/HorizontalMultiLevelHierarchy"/>
-    <dgm:cxn modelId="{0E9DAE43-BD16-4A14-9821-2524BC241F48}" srcId="{CE13128E-9149-4B70-91DE-630C4ABBFE00}" destId="{08C55BA2-31D6-43CA-BE8B-18095A33123C}" srcOrd="1" destOrd="0" parTransId="{6DB745CF-1A78-406B-8408-ECE8759E9FA1}" sibTransId="{E3EE3127-9860-436D-80DB-2AE4EBD12F9F}"/>
-    <dgm:cxn modelId="{B353EAEA-C1EF-497E-AD8A-EEFA8A1765D1}" type="presOf" srcId="{305D8F76-DE5C-477C-9DE0-661AB94732FF}" destId="{2DB62359-910D-4F81-A286-8DE2D01AD00D}" srcOrd="1" destOrd="0" presId="urn:microsoft.com/office/officeart/2008/layout/HorizontalMultiLevelHierarchy"/>
     <dgm:cxn modelId="{E85A5082-869E-40EA-9C36-EDCB529A800C}" type="presParOf" srcId="{48EA20E2-9F73-4378-9103-C6F25598EA7F}" destId="{86C845A6-4E5D-48FE-9B1B-66F63DBF6920}" srcOrd="0" destOrd="0" presId="urn:microsoft.com/office/officeart/2008/layout/HorizontalMultiLevelHierarchy"/>
     <dgm:cxn modelId="{40337B89-9F14-49F4-B9A9-FB9EEE4ADA72}" type="presParOf" srcId="{86C845A6-4E5D-48FE-9B1B-66F63DBF6920}" destId="{85F62DE2-963F-4C4E-96AF-E89F91C81D5C}" srcOrd="0" destOrd="0" presId="urn:microsoft.com/office/officeart/2008/layout/HorizontalMultiLevelHierarchy"/>
     <dgm:cxn modelId="{22D98093-D67B-4619-B710-0A51376D5E73}" type="presParOf" srcId="{86C845A6-4E5D-48FE-9B1B-66F63DBF6920}" destId="{67D192E8-B60F-4363-ADBD-30FA0B008AD7}" srcOrd="1" destOrd="0" presId="urn:microsoft.com/office/officeart/2008/layout/HorizontalMultiLevelHierarchy"/>
@@ -16789,6 +16793,10 @@
               <a:spcPct val="35000"/>
             </a:spcAft>
           </a:pPr>
+          <a:r>
+            <a:rPr lang="pt-BR" sz="4000" kern="1200" dirty="0" smtClean="0"/>
+            <a:t>Configuração</a:t>
+          </a:r>
           <a:endParaRPr lang="pt-BR" sz="4000" kern="1200" dirty="0"/>
         </a:p>
       </dsp:txBody>
@@ -16951,7 +16959,7 @@
           </a:pPr>
           <a:r>
             <a:rPr lang="pt-BR" sz="4000" kern="1200" dirty="0" smtClean="0"/>
-            <a:t>Serviços</a:t>
+            <a:t>Webservices</a:t>
           </a:r>
           <a:endParaRPr lang="pt-BR" sz="4000" kern="1200" dirty="0"/>
         </a:p>
@@ -17037,7 +17045,7 @@
           </a:pPr>
           <a:r>
             <a:rPr lang="pt-BR" sz="2000" kern="1200" dirty="0" smtClean="0"/>
-            <a:t>Base terceiro</a:t>
+            <a:t>Bases terceiras</a:t>
           </a:r>
           <a:endParaRPr lang="pt-BR" sz="2000" kern="1200" dirty="0"/>
         </a:p>
@@ -40291,7 +40299,7 @@
           <a:p>
             <a:fld id="{3F5D9F91-5035-469D-968F-FE3C304D0282}" type="datetimeFigureOut">
               <a:rPr lang="pt-BR" smtClean="0"/>
-              <a:t>21/09/2018</a:t>
+              <a:t>10/10/2018</a:t>
             </a:fld>
             <a:endParaRPr lang="pt-BR"/>
           </a:p>
@@ -40835,7 +40843,7 @@
           <a:p>
             <a:fld id="{6170734A-4B5A-4F3B-B573-1E93A2DEC51B}" type="datetimeFigureOut">
               <a:rPr lang="pt-BR" smtClean="0"/>
-              <a:t>21/09/2018</a:t>
+              <a:t>10/10/2018</a:t>
             </a:fld>
             <a:endParaRPr lang="pt-BR"/>
           </a:p>
@@ -41000,7 +41008,7 @@
           <a:p>
             <a:fld id="{6170734A-4B5A-4F3B-B573-1E93A2DEC51B}" type="datetimeFigureOut">
               <a:rPr lang="pt-BR" smtClean="0"/>
-              <a:t>21/09/2018</a:t>
+              <a:t>10/10/2018</a:t>
             </a:fld>
             <a:endParaRPr lang="pt-BR"/>
           </a:p>
@@ -41175,7 +41183,7 @@
           <a:p>
             <a:fld id="{6170734A-4B5A-4F3B-B573-1E93A2DEC51B}" type="datetimeFigureOut">
               <a:rPr lang="pt-BR" smtClean="0"/>
-              <a:t>21/09/2018</a:t>
+              <a:t>10/10/2018</a:t>
             </a:fld>
             <a:endParaRPr lang="pt-BR"/>
           </a:p>
@@ -41358,7 +41366,7 @@
           <a:p>
             <a:fld id="{6170734A-4B5A-4F3B-B573-1E93A2DEC51B}" type="datetimeFigureOut">
               <a:rPr lang="pt-BR" smtClean="0"/>
-              <a:t>21/09/2018</a:t>
+              <a:t>10/10/2018</a:t>
             </a:fld>
             <a:endParaRPr lang="pt-BR"/>
           </a:p>
@@ -41620,7 +41628,7 @@
           <a:p>
             <a:fld id="{6170734A-4B5A-4F3B-B573-1E93A2DEC51B}" type="datetimeFigureOut">
               <a:rPr lang="pt-BR" smtClean="0"/>
-              <a:t>21/09/2018</a:t>
+              <a:t>10/10/2018</a:t>
             </a:fld>
             <a:endParaRPr lang="pt-BR"/>
           </a:p>
@@ -41968,7 +41976,7 @@
           <a:p>
             <a:fld id="{6170734A-4B5A-4F3B-B573-1E93A2DEC51B}" type="datetimeFigureOut">
               <a:rPr lang="pt-BR" smtClean="0"/>
-              <a:t>21/09/2018</a:t>
+              <a:t>10/10/2018</a:t>
             </a:fld>
             <a:endParaRPr lang="pt-BR"/>
           </a:p>
@@ -42276,7 +42284,7 @@
           <a:p>
             <a:fld id="{6170734A-4B5A-4F3B-B573-1E93A2DEC51B}" type="datetimeFigureOut">
               <a:rPr lang="pt-BR" smtClean="0"/>
-              <a:t>21/09/2018</a:t>
+              <a:t>10/10/2018</a:t>
             </a:fld>
             <a:endParaRPr lang="pt-BR"/>
           </a:p>
@@ -42503,7 +42511,7 @@
           <a:p>
             <a:fld id="{6170734A-4B5A-4F3B-B573-1E93A2DEC51B}" type="datetimeFigureOut">
               <a:rPr lang="pt-BR" smtClean="0"/>
-              <a:t>21/09/2018</a:t>
+              <a:t>10/10/2018</a:t>
             </a:fld>
             <a:endParaRPr lang="pt-BR"/>
           </a:p>
@@ -42593,7 +42601,7 @@
           <a:p>
             <a:fld id="{6170734A-4B5A-4F3B-B573-1E93A2DEC51B}" type="datetimeFigureOut">
               <a:rPr lang="pt-BR" smtClean="0"/>
-              <a:t>21/09/2018</a:t>
+              <a:t>10/10/2018</a:t>
             </a:fld>
             <a:endParaRPr lang="pt-BR"/>
           </a:p>
@@ -42881,7 +42889,7 @@
           <a:p>
             <a:fld id="{6170734A-4B5A-4F3B-B573-1E93A2DEC51B}" type="datetimeFigureOut">
               <a:rPr lang="pt-BR" smtClean="0"/>
-              <a:t>21/09/2018</a:t>
+              <a:t>10/10/2018</a:t>
             </a:fld>
             <a:endParaRPr lang="pt-BR"/>
           </a:p>
@@ -43150,7 +43158,7 @@
           <a:p>
             <a:fld id="{6170734A-4B5A-4F3B-B573-1E93A2DEC51B}" type="datetimeFigureOut">
               <a:rPr lang="pt-BR" smtClean="0"/>
-              <a:t>21/09/2018</a:t>
+              <a:t>10/10/2018</a:t>
             </a:fld>
             <a:endParaRPr lang="pt-BR"/>
           </a:p>
@@ -43360,7 +43368,7 @@
           <a:p>
             <a:fld id="{6170734A-4B5A-4F3B-B573-1E93A2DEC51B}" type="datetimeFigureOut">
               <a:rPr lang="pt-BR" smtClean="0"/>
-              <a:t>21/09/2018</a:t>
+              <a:t>10/10/2018</a:t>
             </a:fld>
             <a:endParaRPr lang="pt-BR"/>
           </a:p>
@@ -44732,6 +44740,40 @@
           </a:extLst>
         </p:spPr>
       </p:pic>
+      <p:sp>
+        <p:nvSpPr>
+          <p:cNvPr id="3" name="CaixaDeTexto 2"/>
+          <p:cNvSpPr txBox="1"/>
+          <p:nvPr/>
+        </p:nvSpPr>
+        <p:spPr>
+          <a:xfrm>
+            <a:off x="5875631" y="6237312"/>
+            <a:ext cx="2045753" cy="307777"/>
+          </a:xfrm>
+          <a:prstGeom prst="rect">
+            <a:avLst/>
+          </a:prstGeom>
+          <a:noFill/>
+        </p:spPr>
+        <p:txBody>
+          <a:bodyPr wrap="none" rtlCol="0">
+            <a:spAutoFit/>
+          </a:bodyPr>
+          <a:lstStyle/>
+          <a:p>
+            <a:r>
+              <a:rPr lang="pt-BR" sz="1400" dirty="0" smtClean="0">
+                <a:latin typeface="Palatino Linotype (Corpo)"/>
+              </a:rPr>
+              <a:t>Resolução da atividade</a:t>
+            </a:r>
+            <a:endParaRPr lang="pt-BR" sz="1400" dirty="0">
+              <a:latin typeface="Palatino Linotype (Corpo)"/>
+            </a:endParaRPr>
+          </a:p>
+        </p:txBody>
+      </p:sp>
     </p:spTree>
     <p:extLst>
       <p:ext uri="{BB962C8B-B14F-4D97-AF65-F5344CB8AC3E}">
@@ -45212,35 +45254,35 @@
                 <a:gridCol w="558501">
                   <a:extLst>
                     <a:ext uri="{9D8B030D-6E8A-4147-A177-3AD203B41FA5}">
-                      <a16:colId xmlns:a16="http://schemas.microsoft.com/office/drawing/2014/main" val="20000"/>
+                      <a16:colId xmlns:a16="http://schemas.microsoft.com/office/drawing/2014/main" xmlns="" val="20000"/>
                     </a:ext>
                   </a:extLst>
                 </a:gridCol>
                 <a:gridCol w="5238155">
                   <a:extLst>
                     <a:ext uri="{9D8B030D-6E8A-4147-A177-3AD203B41FA5}">
-                      <a16:colId xmlns:a16="http://schemas.microsoft.com/office/drawing/2014/main" val="20001"/>
+                      <a16:colId xmlns:a16="http://schemas.microsoft.com/office/drawing/2014/main" xmlns="" val="20001"/>
                     </a:ext>
                   </a:extLst>
                 </a:gridCol>
                 <a:gridCol w="703633">
                   <a:extLst>
                     <a:ext uri="{9D8B030D-6E8A-4147-A177-3AD203B41FA5}">
-                      <a16:colId xmlns:a16="http://schemas.microsoft.com/office/drawing/2014/main" val="20002"/>
+                      <a16:colId xmlns:a16="http://schemas.microsoft.com/office/drawing/2014/main" xmlns="" val="20002"/>
                     </a:ext>
                   </a:extLst>
                 </a:gridCol>
                 <a:gridCol w="1563628">
                   <a:extLst>
                     <a:ext uri="{9D8B030D-6E8A-4147-A177-3AD203B41FA5}">
-                      <a16:colId xmlns:a16="http://schemas.microsoft.com/office/drawing/2014/main" val="20003"/>
+                      <a16:colId xmlns:a16="http://schemas.microsoft.com/office/drawing/2014/main" xmlns="" val="20003"/>
                     </a:ext>
                   </a:extLst>
                 </a:gridCol>
                 <a:gridCol w="871226">
                   <a:extLst>
                     <a:ext uri="{9D8B030D-6E8A-4147-A177-3AD203B41FA5}">
-                      <a16:colId xmlns:a16="http://schemas.microsoft.com/office/drawing/2014/main" val="20004"/>
+                      <a16:colId xmlns:a16="http://schemas.microsoft.com/office/drawing/2014/main" xmlns="" val="20004"/>
                     </a:ext>
                   </a:extLst>
                 </a:gridCol>
@@ -45355,7 +45397,7 @@
                 </a:tc>
                 <a:extLst>
                   <a:ext uri="{0D108BD9-81ED-4DB2-BD59-A6C34878D82A}">
-                    <a16:rowId xmlns:a16="http://schemas.microsoft.com/office/drawing/2014/main" val="10000"/>
+                    <a16:rowId xmlns:a16="http://schemas.microsoft.com/office/drawing/2014/main" xmlns="" val="10000"/>
                   </a:ext>
                 </a:extLst>
               </a:tr>
@@ -45462,7 +45504,7 @@
                 </a:tc>
                 <a:extLst>
                   <a:ext uri="{0D108BD9-81ED-4DB2-BD59-A6C34878D82A}">
-                    <a16:rowId xmlns:a16="http://schemas.microsoft.com/office/drawing/2014/main" val="10001"/>
+                    <a16:rowId xmlns:a16="http://schemas.microsoft.com/office/drawing/2014/main" xmlns="" val="10001"/>
                   </a:ext>
                 </a:extLst>
               </a:tr>
@@ -45569,7 +45611,7 @@
                 </a:tc>
                 <a:extLst>
                   <a:ext uri="{0D108BD9-81ED-4DB2-BD59-A6C34878D82A}">
-                    <a16:rowId xmlns:a16="http://schemas.microsoft.com/office/drawing/2014/main" val="10002"/>
+                    <a16:rowId xmlns:a16="http://schemas.microsoft.com/office/drawing/2014/main" xmlns="" val="10002"/>
                   </a:ext>
                 </a:extLst>
               </a:tr>
@@ -45676,7 +45718,7 @@
                 </a:tc>
                 <a:extLst>
                   <a:ext uri="{0D108BD9-81ED-4DB2-BD59-A6C34878D82A}">
-                    <a16:rowId xmlns:a16="http://schemas.microsoft.com/office/drawing/2014/main" val="10003"/>
+                    <a16:rowId xmlns:a16="http://schemas.microsoft.com/office/drawing/2014/main" xmlns="" val="10003"/>
                   </a:ext>
                 </a:extLst>
               </a:tr>
@@ -45790,7 +45832,7 @@
                 </a:tc>
                 <a:extLst>
                   <a:ext uri="{0D108BD9-81ED-4DB2-BD59-A6C34878D82A}">
-                    <a16:rowId xmlns:a16="http://schemas.microsoft.com/office/drawing/2014/main" val="10004"/>
+                    <a16:rowId xmlns:a16="http://schemas.microsoft.com/office/drawing/2014/main" xmlns="" val="10004"/>
                   </a:ext>
                 </a:extLst>
               </a:tr>
@@ -45897,7 +45939,7 @@
                 </a:tc>
                 <a:extLst>
                   <a:ext uri="{0D108BD9-81ED-4DB2-BD59-A6C34878D82A}">
-                    <a16:rowId xmlns:a16="http://schemas.microsoft.com/office/drawing/2014/main" val="10005"/>
+                    <a16:rowId xmlns:a16="http://schemas.microsoft.com/office/drawing/2014/main" xmlns="" val="10005"/>
                   </a:ext>
                 </a:extLst>
               </a:tr>
@@ -46004,7 +46046,7 @@
                 </a:tc>
                 <a:extLst>
                   <a:ext uri="{0D108BD9-81ED-4DB2-BD59-A6C34878D82A}">
-                    <a16:rowId xmlns:a16="http://schemas.microsoft.com/office/drawing/2014/main" val="10006"/>
+                    <a16:rowId xmlns:a16="http://schemas.microsoft.com/office/drawing/2014/main" xmlns="" val="10006"/>
                   </a:ext>
                 </a:extLst>
               </a:tr>
@@ -46111,7 +46153,7 @@
                 </a:tc>
                 <a:extLst>
                   <a:ext uri="{0D108BD9-81ED-4DB2-BD59-A6C34878D82A}">
-                    <a16:rowId xmlns:a16="http://schemas.microsoft.com/office/drawing/2014/main" val="10007"/>
+                    <a16:rowId xmlns:a16="http://schemas.microsoft.com/office/drawing/2014/main" xmlns="" val="10007"/>
                   </a:ext>
                 </a:extLst>
               </a:tr>
@@ -46218,7 +46260,7 @@
                 </a:tc>
                 <a:extLst>
                   <a:ext uri="{0D108BD9-81ED-4DB2-BD59-A6C34878D82A}">
-                    <a16:rowId xmlns:a16="http://schemas.microsoft.com/office/drawing/2014/main" val="10008"/>
+                    <a16:rowId xmlns:a16="http://schemas.microsoft.com/office/drawing/2014/main" xmlns="" val="10008"/>
                   </a:ext>
                 </a:extLst>
               </a:tr>
@@ -46275,7 +46317,7 @@
                 </a:tc>
                 <a:extLst>
                   <a:ext uri="{0D108BD9-81ED-4DB2-BD59-A6C34878D82A}">
-                    <a16:rowId xmlns:a16="http://schemas.microsoft.com/office/drawing/2014/main" val="10009"/>
+                    <a16:rowId xmlns:a16="http://schemas.microsoft.com/office/drawing/2014/main" xmlns="" val="10009"/>
                   </a:ext>
                 </a:extLst>
               </a:tr>
@@ -46794,32 +46836,9 @@
           <a:lstStyle/>
           <a:p>
             <a:r>
-              <a:rPr lang="pt-BR" dirty="0" smtClean="0"/>
-              <a:t>`</a:t>
-            </a:r>
-            <a:r>
               <a:rPr lang="pt-BR" dirty="0" err="1" smtClean="0"/>
               <a:t>Trello</a:t>
             </a:r>
-            <a:endParaRPr lang="pt-BR" dirty="0"/>
-          </a:p>
-        </p:txBody>
-      </p:sp>
-      <p:sp>
-        <p:nvSpPr>
-          <p:cNvPr id="3" name="Espaço Reservado para Conteúdo 2"/>
-          <p:cNvSpPr>
-            <a:spLocks noGrp="1"/>
-          </p:cNvSpPr>
-          <p:nvPr>
-            <p:ph idx="1"/>
-          </p:nvPr>
-        </p:nvSpPr>
-        <p:spPr/>
-        <p:txBody>
-          <a:bodyPr/>
-          <a:lstStyle/>
-          <a:p>
             <a:endParaRPr lang="pt-BR" dirty="0"/>
           </a:p>
         </p:txBody>
@@ -46870,7 +46889,7 @@
       </p:pic>
       <p:pic>
         <p:nvPicPr>
-          <p:cNvPr id="1026" name="Picture 2"/>
+          <p:cNvPr id="5" name="Picture 2"/>
           <p:cNvPicPr>
             <a:picLocks noChangeAspect="1" noChangeArrowheads="1"/>
           </p:cNvPicPr>
@@ -46884,13 +46903,13 @@
               </a:ext>
             </a:extLst>
           </a:blip>
-          <a:srcRect l="788" t="11826" r="42849" b="8264"/>
+          <a:srcRect l="-138" t="18832" r="42803" b="8358"/>
           <a:stretch/>
         </p:blipFill>
         <p:spPr bwMode="auto">
           <a:xfrm>
-            <a:off x="123986" y="1379349"/>
-            <a:ext cx="8887393" cy="5331418"/>
+            <a:off x="156592" y="1556792"/>
+            <a:ext cx="8801428" cy="4824536"/>
           </a:xfrm>
           <a:prstGeom prst="rect">
             <a:avLst/>
@@ -47343,7 +47362,7 @@
             <p:ph idx="1"/>
             <p:extLst>
               <p:ext uri="{D42A27DB-BD31-4B8C-83A1-F6EECF244321}">
-                <p14:modId xmlns:p14="http://schemas.microsoft.com/office/powerpoint/2010/main" val="1040428288"/>
+                <p14:modId xmlns:p14="http://schemas.microsoft.com/office/powerpoint/2010/main" val="1693257145"/>
               </p:ext>
             </p:extLst>
           </p:nvPr>
@@ -48966,35 +48985,35 @@
                 <a:gridCol w="3111033">
                   <a:extLst>
                     <a:ext uri="{9D8B030D-6E8A-4147-A177-3AD203B41FA5}">
-                      <a16:colId xmlns:a16="http://schemas.microsoft.com/office/drawing/2014/main" val="20000"/>
+                      <a16:colId xmlns:a16="http://schemas.microsoft.com/office/drawing/2014/main" xmlns="" val="20000"/>
                     </a:ext>
                   </a:extLst>
                 </a:gridCol>
                 <a:gridCol w="993424">
                   <a:extLst>
                     <a:ext uri="{9D8B030D-6E8A-4147-A177-3AD203B41FA5}">
-                      <a16:colId xmlns:a16="http://schemas.microsoft.com/office/drawing/2014/main" val="20001"/>
+                      <a16:colId xmlns:a16="http://schemas.microsoft.com/office/drawing/2014/main" xmlns="" val="20001"/>
                     </a:ext>
                   </a:extLst>
                 </a:gridCol>
                 <a:gridCol w="1368152">
                   <a:extLst>
                     <a:ext uri="{9D8B030D-6E8A-4147-A177-3AD203B41FA5}">
-                      <a16:colId xmlns:a16="http://schemas.microsoft.com/office/drawing/2014/main" val="20002"/>
+                      <a16:colId xmlns:a16="http://schemas.microsoft.com/office/drawing/2014/main" xmlns="" val="20002"/>
                     </a:ext>
                   </a:extLst>
                 </a:gridCol>
                 <a:gridCol w="1512168">
                   <a:extLst>
                     <a:ext uri="{9D8B030D-6E8A-4147-A177-3AD203B41FA5}">
-                      <a16:colId xmlns:a16="http://schemas.microsoft.com/office/drawing/2014/main" val="20003"/>
+                      <a16:colId xmlns:a16="http://schemas.microsoft.com/office/drawing/2014/main" xmlns="" val="20003"/>
                     </a:ext>
                   </a:extLst>
                 </a:gridCol>
                 <a:gridCol w="1872207">
                   <a:extLst>
                     <a:ext uri="{9D8B030D-6E8A-4147-A177-3AD203B41FA5}">
-                      <a16:colId xmlns:a16="http://schemas.microsoft.com/office/drawing/2014/main" val="20004"/>
+                      <a16:colId xmlns:a16="http://schemas.microsoft.com/office/drawing/2014/main" xmlns="" val="20004"/>
                     </a:ext>
                   </a:extLst>
                 </a:gridCol>
@@ -49157,7 +49176,7 @@
                 </a:tc>
                 <a:extLst>
                   <a:ext uri="{0D108BD9-81ED-4DB2-BD59-A6C34878D82A}">
-                    <a16:rowId xmlns:a16="http://schemas.microsoft.com/office/drawing/2014/main" val="10000"/>
+                    <a16:rowId xmlns:a16="http://schemas.microsoft.com/office/drawing/2014/main" xmlns="" val="10000"/>
                   </a:ext>
                 </a:extLst>
               </a:tr>
@@ -49328,7 +49347,7 @@
                 </a:tc>
                 <a:extLst>
                   <a:ext uri="{0D108BD9-81ED-4DB2-BD59-A6C34878D82A}">
-                    <a16:rowId xmlns:a16="http://schemas.microsoft.com/office/drawing/2014/main" val="10001"/>
+                    <a16:rowId xmlns:a16="http://schemas.microsoft.com/office/drawing/2014/main" xmlns="" val="10001"/>
                   </a:ext>
                 </a:extLst>
               </a:tr>
@@ -49496,7 +49515,7 @@
                 </a:tc>
                 <a:extLst>
                   <a:ext uri="{0D108BD9-81ED-4DB2-BD59-A6C34878D82A}">
-                    <a16:rowId xmlns:a16="http://schemas.microsoft.com/office/drawing/2014/main" val="10002"/>
+                    <a16:rowId xmlns:a16="http://schemas.microsoft.com/office/drawing/2014/main" xmlns="" val="10002"/>
                   </a:ext>
                 </a:extLst>
               </a:tr>
@@ -49664,7 +49683,7 @@
                 </a:tc>
                 <a:extLst>
                   <a:ext uri="{0D108BD9-81ED-4DB2-BD59-A6C34878D82A}">
-                    <a16:rowId xmlns:a16="http://schemas.microsoft.com/office/drawing/2014/main" val="10003"/>
+                    <a16:rowId xmlns:a16="http://schemas.microsoft.com/office/drawing/2014/main" xmlns="" val="10003"/>
                   </a:ext>
                 </a:extLst>
               </a:tr>
@@ -49823,7 +49842,7 @@
                 </a:tc>
                 <a:extLst>
                   <a:ext uri="{0D108BD9-81ED-4DB2-BD59-A6C34878D82A}">
-                    <a16:rowId xmlns:a16="http://schemas.microsoft.com/office/drawing/2014/main" val="10004"/>
+                    <a16:rowId xmlns:a16="http://schemas.microsoft.com/office/drawing/2014/main" xmlns="" val="10004"/>
                   </a:ext>
                 </a:extLst>
               </a:tr>
@@ -49991,7 +50010,7 @@
                 </a:tc>
                 <a:extLst>
                   <a:ext uri="{0D108BD9-81ED-4DB2-BD59-A6C34878D82A}">
-                    <a16:rowId xmlns:a16="http://schemas.microsoft.com/office/drawing/2014/main" val="10005"/>
+                    <a16:rowId xmlns:a16="http://schemas.microsoft.com/office/drawing/2014/main" xmlns="" val="10005"/>
                   </a:ext>
                 </a:extLst>
               </a:tr>
@@ -50150,7 +50169,7 @@
                 </a:tc>
                 <a:extLst>
                   <a:ext uri="{0D108BD9-81ED-4DB2-BD59-A6C34878D82A}">
-                    <a16:rowId xmlns:a16="http://schemas.microsoft.com/office/drawing/2014/main" val="10006"/>
+                    <a16:rowId xmlns:a16="http://schemas.microsoft.com/office/drawing/2014/main" xmlns="" val="10006"/>
                   </a:ext>
                 </a:extLst>
               </a:tr>
@@ -50321,7 +50340,7 @@
                 </a:tc>
                 <a:extLst>
                   <a:ext uri="{0D108BD9-81ED-4DB2-BD59-A6C34878D82A}">
-                    <a16:rowId xmlns:a16="http://schemas.microsoft.com/office/drawing/2014/main" val="10007"/>
+                    <a16:rowId xmlns:a16="http://schemas.microsoft.com/office/drawing/2014/main" xmlns="" val="10007"/>
                   </a:ext>
                 </a:extLst>
               </a:tr>
@@ -50501,7 +50520,7 @@
                 </a:tc>
                 <a:extLst>
                   <a:ext uri="{0D108BD9-81ED-4DB2-BD59-A6C34878D82A}">
-                    <a16:rowId xmlns:a16="http://schemas.microsoft.com/office/drawing/2014/main" val="10008"/>
+                    <a16:rowId xmlns:a16="http://schemas.microsoft.com/office/drawing/2014/main" xmlns="" val="10008"/>
                   </a:ext>
                 </a:extLst>
               </a:tr>
@@ -50672,7 +50691,7 @@
                 </a:tc>
                 <a:extLst>
                   <a:ext uri="{0D108BD9-81ED-4DB2-BD59-A6C34878D82A}">
-                    <a16:rowId xmlns:a16="http://schemas.microsoft.com/office/drawing/2014/main" val="10009"/>
+                    <a16:rowId xmlns:a16="http://schemas.microsoft.com/office/drawing/2014/main" xmlns="" val="10009"/>
                   </a:ext>
                 </a:extLst>
               </a:tr>

</xml_diff>